<commit_message>
updated link fonts on sdk page
</commit_message>
<xml_diff>
--- a/indexing-nirvana.pptx
+++ b/indexing-nirvana.pptx
@@ -213,7 +213,7 @@
           <a:p>
             <a:fld id="{554481DA-44F1-3746-B19A-AB72460DEAAC}" type="datetimeFigureOut">
               <a:rPr lang="en-US" smtClean="0"/>
-              <a:t>8/12/2015</a:t>
+              <a:t>8/12/15</a:t>
             </a:fld>
             <a:endParaRPr lang="en-US"/>
           </a:p>
@@ -811,7 +811,7 @@
                 </a:solidFill>
               </a:rPr>
               <a:pPr/>
-              <a:t>8/12/2015 11:45</a:t>
+              <a:t>8/12/15 3:28 PM</a:t>
             </a:fld>
             <a:endParaRPr lang="en-US" dirty="0">
               <a:solidFill>
@@ -1038,7 +1038,7 @@
                 </a:solidFill>
               </a:rPr>
               <a:pPr/>
-              <a:t>8/12/2015 11:45</a:t>
+              <a:t>8/12/15 3:28 PM</a:t>
             </a:fld>
             <a:endParaRPr lang="en-US" dirty="0">
               <a:solidFill>
@@ -1248,7 +1248,7 @@
                 </a:solidFill>
               </a:rPr>
               <a:pPr/>
-              <a:t>8/12/2015 11:45</a:t>
+              <a:t>8/12/15 3:28 PM</a:t>
             </a:fld>
             <a:endParaRPr lang="en-US" dirty="0">
               <a:solidFill>
@@ -1458,7 +1458,7 @@
                 </a:solidFill>
               </a:rPr>
               <a:pPr/>
-              <a:t>8/12/2015 11:45</a:t>
+              <a:t>8/12/15 3:28 PM</a:t>
             </a:fld>
             <a:endParaRPr lang="en-US" dirty="0">
               <a:solidFill>
@@ -1668,7 +1668,7 @@
                 </a:solidFill>
               </a:rPr>
               <a:pPr/>
-              <a:t>8/12/2015 11:45</a:t>
+              <a:t>8/12/15 3:28 PM</a:t>
             </a:fld>
             <a:endParaRPr lang="en-US" dirty="0">
               <a:solidFill>
@@ -1878,7 +1878,7 @@
                 </a:solidFill>
               </a:rPr>
               <a:pPr/>
-              <a:t>8/12/2015 11:45</a:t>
+              <a:t>8/12/15 3:28 PM</a:t>
             </a:fld>
             <a:endParaRPr lang="en-US" dirty="0">
               <a:solidFill>
@@ -2131,7 +2131,7 @@
                 </a:solidFill>
               </a:rPr>
               <a:pPr/>
-              <a:t>8/12/2015 11:46</a:t>
+              <a:t>8/12/15 3:28 PM</a:t>
             </a:fld>
             <a:endParaRPr lang="en-US" dirty="0">
               <a:solidFill>
@@ -2341,7 +2341,7 @@
                 </a:solidFill>
               </a:rPr>
               <a:pPr/>
-              <a:t>8/12/2015 11:46</a:t>
+              <a:t>8/12/15 3:28 PM</a:t>
             </a:fld>
             <a:endParaRPr lang="en-US" dirty="0">
               <a:solidFill>
@@ -2527,7 +2527,7 @@
           <a:p>
             <a:fld id="{B15FBB8C-084E-354C-BBCD-E95225EFA9A1}" type="datetimeFigureOut">
               <a:rPr lang="en-US" smtClean="0"/>
-              <a:t>8/12/2015</a:t>
+              <a:t>8/12/15</a:t>
             </a:fld>
             <a:endParaRPr lang="en-US"/>
           </a:p>
@@ -2697,7 +2697,7 @@
           <a:p>
             <a:fld id="{B15FBB8C-084E-354C-BBCD-E95225EFA9A1}" type="datetimeFigureOut">
               <a:rPr lang="en-US" smtClean="0"/>
-              <a:t>8/12/2015</a:t>
+              <a:t>8/12/15</a:t>
             </a:fld>
             <a:endParaRPr lang="en-US"/>
           </a:p>
@@ -2877,7 +2877,7 @@
           <a:p>
             <a:fld id="{B15FBB8C-084E-354C-BBCD-E95225EFA9A1}" type="datetimeFigureOut">
               <a:rPr lang="en-US" smtClean="0"/>
-              <a:t>8/12/2015</a:t>
+              <a:t>8/12/15</a:t>
             </a:fld>
             <a:endParaRPr lang="en-US"/>
           </a:p>
@@ -3567,13 +3567,13 @@
   <p:clrMapOvr>
     <a:overrideClrMapping bg1="lt1" tx1="dk1" bg2="lt2" tx2="dk2" accent1="accent1" accent2="accent2" accent3="accent3" accent4="accent4" accent5="accent5" accent6="accent6" hlink="hlink" folHlink="folHlink"/>
   </p:clrMapOvr>
-  <mc:AlternateContent xmlns:mc="http://schemas.openxmlformats.org/markup-compatibility/2006">
-    <mc:Choice xmlns:p14="http://schemas.microsoft.com/office/powerpoint/2010/main" Requires="p14">
+  <mc:AlternateContent xmlns:mc="http://schemas.openxmlformats.org/markup-compatibility/2006" xmlns:p14="http://schemas.microsoft.com/office/powerpoint/2010/main">
+    <mc:Choice Requires="p14">
       <p:transition spd="med" p14:dur="700">
         <p:fade/>
       </p:transition>
     </mc:Choice>
-    <mc:Fallback>
+    <mc:Fallback xmlns="">
       <p:transition spd="med">
         <p:fade/>
       </p:transition>
@@ -3854,13 +3854,13 @@
   <p:clrMapOvr>
     <a:overrideClrMapping bg1="lt1" tx1="dk1" bg2="lt2" tx2="dk2" accent1="accent1" accent2="accent2" accent3="accent3" accent4="accent4" accent5="accent5" accent6="accent6" hlink="hlink" folHlink="folHlink"/>
   </p:clrMapOvr>
-  <mc:AlternateContent xmlns:mc="http://schemas.openxmlformats.org/markup-compatibility/2006">
-    <mc:Choice xmlns:p14="http://schemas.microsoft.com/office/powerpoint/2010/main" Requires="p14">
+  <mc:AlternateContent xmlns:mc="http://schemas.openxmlformats.org/markup-compatibility/2006" xmlns:p14="http://schemas.microsoft.com/office/powerpoint/2010/main">
+    <mc:Choice Requires="p14">
       <p:transition spd="slow" p14:dur="3400">
         <p14:reveal/>
       </p:transition>
     </mc:Choice>
-    <mc:Fallback>
+    <mc:Fallback xmlns="">
       <p:transition spd="slow">
         <p:fade/>
       </p:transition>
@@ -4825,7 +4825,7 @@
           <a:p>
             <a:fld id="{B15FBB8C-084E-354C-BBCD-E95225EFA9A1}" type="datetimeFigureOut">
               <a:rPr lang="en-US" smtClean="0"/>
-              <a:t>8/12/2015</a:t>
+              <a:t>8/12/15</a:t>
             </a:fld>
             <a:endParaRPr lang="en-US"/>
           </a:p>
@@ -5979,13 +5979,13 @@
   <p:clrMapOvr>
     <a:overrideClrMapping bg1="lt1" tx1="dk1" bg2="lt2" tx2="dk2" accent1="accent1" accent2="accent2" accent3="accent3" accent4="accent4" accent5="accent5" accent6="accent6" hlink="hlink" folHlink="folHlink"/>
   </p:clrMapOvr>
-  <mc:AlternateContent xmlns:mc="http://schemas.openxmlformats.org/markup-compatibility/2006">
-    <mc:Choice xmlns:p14="http://schemas.microsoft.com/office/powerpoint/2010/main" Requires="p14">
+  <mc:AlternateContent xmlns:mc="http://schemas.openxmlformats.org/markup-compatibility/2006" xmlns:p14="http://schemas.microsoft.com/office/powerpoint/2010/main">
+    <mc:Choice Requires="p14">
       <p:transition spd="slow" p14:dur="3400">
         <p14:reveal/>
       </p:transition>
     </mc:Choice>
-    <mc:Fallback>
+    <mc:Fallback xmlns="">
       <p:transition spd="slow">
         <p:fade/>
       </p:transition>
@@ -6223,13 +6223,13 @@
   <p:clrMapOvr>
     <a:overrideClrMapping bg1="lt1" tx1="dk1" bg2="lt2" tx2="dk2" accent1="accent1" accent2="accent2" accent3="accent3" accent4="accent4" accent5="accent5" accent6="accent6" hlink="hlink" folHlink="folHlink"/>
   </p:clrMapOvr>
-  <mc:AlternateContent xmlns:mc="http://schemas.openxmlformats.org/markup-compatibility/2006">
-    <mc:Choice xmlns:p14="http://schemas.microsoft.com/office/powerpoint/2010/main" Requires="p14">
+  <mc:AlternateContent xmlns:mc="http://schemas.openxmlformats.org/markup-compatibility/2006" xmlns:p14="http://schemas.microsoft.com/office/powerpoint/2010/main">
+    <mc:Choice Requires="p14">
       <p:transition spd="slow" p14:dur="3400">
         <p14:reveal/>
       </p:transition>
     </mc:Choice>
-    <mc:Fallback>
+    <mc:Fallback xmlns="">
       <p:transition spd="slow">
         <p:fade/>
       </p:transition>
@@ -6837,7 +6837,7 @@
           <a:p>
             <a:fld id="{B15FBB8C-084E-354C-BBCD-E95225EFA9A1}" type="datetimeFigureOut">
               <a:rPr lang="en-US" smtClean="0"/>
-              <a:t>8/12/2015</a:t>
+              <a:t>8/12/15</a:t>
             </a:fld>
             <a:endParaRPr lang="en-US"/>
           </a:p>
@@ -8649,7 +8649,7 @@
           <a:p>
             <a:fld id="{B15FBB8C-084E-354C-BBCD-E95225EFA9A1}" type="datetimeFigureOut">
               <a:rPr lang="en-US" smtClean="0"/>
-              <a:t>8/12/2015</a:t>
+              <a:t>8/12/15</a:t>
             </a:fld>
             <a:endParaRPr lang="en-US"/>
           </a:p>
@@ -9721,13 +9721,13 @@
   <p:clrMapOvr>
     <a:overrideClrMapping bg1="lt1" tx1="dk1" bg2="lt2" tx2="dk2" accent1="accent1" accent2="accent2" accent3="accent3" accent4="accent4" accent5="accent5" accent6="accent6" hlink="hlink" folHlink="folHlink"/>
   </p:clrMapOvr>
-  <mc:AlternateContent xmlns:mc="http://schemas.openxmlformats.org/markup-compatibility/2006">
-    <mc:Choice xmlns:p14="http://schemas.microsoft.com/office/powerpoint/2010/main" Requires="p14">
+  <mc:AlternateContent xmlns:mc="http://schemas.openxmlformats.org/markup-compatibility/2006" xmlns:p14="http://schemas.microsoft.com/office/powerpoint/2010/main">
+    <mc:Choice Requires="p14">
       <p:transition spd="med" p14:dur="700">
         <p:fade/>
       </p:transition>
     </mc:Choice>
-    <mc:Fallback>
+    <mc:Fallback xmlns="">
       <p:transition spd="med">
         <p:fade/>
       </p:transition>
@@ -10008,13 +10008,13 @@
   <p:clrMapOvr>
     <a:overrideClrMapping bg1="lt1" tx1="dk1" bg2="lt2" tx2="dk2" accent1="accent1" accent2="accent2" accent3="accent3" accent4="accent4" accent5="accent5" accent6="accent6" hlink="hlink" folHlink="folHlink"/>
   </p:clrMapOvr>
-  <mc:AlternateContent xmlns:mc="http://schemas.openxmlformats.org/markup-compatibility/2006">
-    <mc:Choice xmlns:p14="http://schemas.microsoft.com/office/powerpoint/2010/main" Requires="p14">
+  <mc:AlternateContent xmlns:mc="http://schemas.openxmlformats.org/markup-compatibility/2006" xmlns:p14="http://schemas.microsoft.com/office/powerpoint/2010/main">
+    <mc:Choice Requires="p14">
       <p:transition spd="slow" p14:dur="3400">
         <p14:reveal/>
       </p:transition>
     </mc:Choice>
-    <mc:Fallback>
+    <mc:Fallback xmlns="">
       <p:transition spd="slow">
         <p:fade/>
       </p:transition>
@@ -11176,7 +11176,7 @@
           <a:p>
             <a:fld id="{B15FBB8C-084E-354C-BBCD-E95225EFA9A1}" type="datetimeFigureOut">
               <a:rPr lang="en-US" smtClean="0"/>
-              <a:t>8/12/2015</a:t>
+              <a:t>8/12/15</a:t>
             </a:fld>
             <a:endParaRPr lang="en-US"/>
           </a:p>
@@ -12330,13 +12330,13 @@
   <p:clrMapOvr>
     <a:overrideClrMapping bg1="lt1" tx1="dk1" bg2="lt2" tx2="dk2" accent1="accent1" accent2="accent2" accent3="accent3" accent4="accent4" accent5="accent5" accent6="accent6" hlink="hlink" folHlink="folHlink"/>
   </p:clrMapOvr>
-  <mc:AlternateContent xmlns:mc="http://schemas.openxmlformats.org/markup-compatibility/2006">
-    <mc:Choice xmlns:p14="http://schemas.microsoft.com/office/powerpoint/2010/main" Requires="p14">
+  <mc:AlternateContent xmlns:mc="http://schemas.openxmlformats.org/markup-compatibility/2006" xmlns:p14="http://schemas.microsoft.com/office/powerpoint/2010/main">
+    <mc:Choice Requires="p14">
       <p:transition spd="slow" p14:dur="3400">
         <p14:reveal/>
       </p:transition>
     </mc:Choice>
-    <mc:Fallback>
+    <mc:Fallback xmlns="">
       <p:transition spd="slow">
         <p:fade/>
       </p:transition>
@@ -12574,13 +12574,13 @@
   <p:clrMapOvr>
     <a:overrideClrMapping bg1="lt1" tx1="dk1" bg2="lt2" tx2="dk2" accent1="accent1" accent2="accent2" accent3="accent3" accent4="accent4" accent5="accent5" accent6="accent6" hlink="hlink" folHlink="folHlink"/>
   </p:clrMapOvr>
-  <mc:AlternateContent xmlns:mc="http://schemas.openxmlformats.org/markup-compatibility/2006">
-    <mc:Choice xmlns:p14="http://schemas.microsoft.com/office/powerpoint/2010/main" Requires="p14">
+  <mc:AlternateContent xmlns:mc="http://schemas.openxmlformats.org/markup-compatibility/2006" xmlns:p14="http://schemas.microsoft.com/office/powerpoint/2010/main">
+    <mc:Choice Requires="p14">
       <p:transition spd="slow" p14:dur="3400">
         <p14:reveal/>
       </p:transition>
     </mc:Choice>
-    <mc:Fallback>
+    <mc:Fallback xmlns="">
       <p:transition spd="slow">
         <p:fade/>
       </p:transition>
@@ -13060,7 +13060,7 @@
           <a:p>
             <a:fld id="{B15FBB8C-084E-354C-BBCD-E95225EFA9A1}" type="datetimeFigureOut">
               <a:rPr lang="en-US" smtClean="0"/>
-              <a:t>8/12/2015</a:t>
+              <a:t>8/12/15</a:t>
             </a:fld>
             <a:endParaRPr lang="en-US"/>
           </a:p>
@@ -14735,7 +14735,7 @@
           <a:p>
             <a:fld id="{B15FBB8C-084E-354C-BBCD-E95225EFA9A1}" type="datetimeFigureOut">
               <a:rPr lang="en-US" smtClean="0"/>
-              <a:t>8/12/2015</a:t>
+              <a:t>8/12/15</a:t>
             </a:fld>
             <a:endParaRPr lang="en-US"/>
           </a:p>
@@ -15568,7 +15568,7 @@
           <a:p>
             <a:fld id="{B15FBB8C-084E-354C-BBCD-E95225EFA9A1}" type="datetimeFigureOut">
               <a:rPr lang="en-US" smtClean="0"/>
-              <a:t>8/12/2015</a:t>
+              <a:t>8/12/15</a:t>
             </a:fld>
             <a:endParaRPr lang="en-US"/>
           </a:p>
@@ -15821,7 +15821,7 @@
           <a:p>
             <a:fld id="{B15FBB8C-084E-354C-BBCD-E95225EFA9A1}" type="datetimeFigureOut">
               <a:rPr lang="en-US" smtClean="0"/>
-              <a:t>8/12/2015</a:t>
+              <a:t>8/12/15</a:t>
             </a:fld>
             <a:endParaRPr lang="en-US"/>
           </a:p>
@@ -16034,7 +16034,7 @@
           <a:p>
             <a:fld id="{B15FBB8C-084E-354C-BBCD-E95225EFA9A1}" type="datetimeFigureOut">
               <a:rPr lang="en-US" smtClean="0"/>
-              <a:t>8/12/2015</a:t>
+              <a:t>8/12/15</a:t>
             </a:fld>
             <a:endParaRPr lang="en-US"/>
           </a:p>
@@ -16977,132 +16977,132 @@
   <p:extLst mod="1">
     <p:ext uri="{27BBF7A9-308A-43DC-89C8-2F10F3537804}">
       <p15:sldGuideLst xmlns:p15="http://schemas.microsoft.com/office/powerpoint/2012/main">
-        <p15:guide id="4294967295" orient="horz" pos="187">
+        <p15:guide id="1" orient="horz" pos="187">
           <p15:clr>
             <a:srgbClr val="5ACBF0"/>
           </p15:clr>
         </p15:guide>
-        <p15:guide id="4294967295" pos="173">
+        <p15:guide id="2" pos="173">
           <p15:clr>
             <a:srgbClr val="5ACBF0"/>
           </p15:clr>
         </p15:guide>
-        <p15:guide id="4294967295" pos="749">
+        <p15:guide id="3" pos="749">
           <p15:clr>
             <a:srgbClr val="5ACBF0"/>
           </p15:clr>
         </p15:guide>
-        <p15:guide id="4294967295" pos="1325">
+        <p15:guide id="4" pos="1325">
           <p15:clr>
             <a:srgbClr val="5ACBF0"/>
           </p15:clr>
         </p15:guide>
-        <p15:guide id="4294967295" pos="1901">
+        <p15:guide id="5" pos="1901">
           <p15:clr>
             <a:srgbClr val="5ACBF0"/>
           </p15:clr>
         </p15:guide>
-        <p15:guide id="4294967295" pos="2477">
+        <p15:guide id="6" pos="2477">
           <p15:clr>
             <a:srgbClr val="5ACBF0"/>
           </p15:clr>
         </p15:guide>
-        <p15:guide id="4294967295" pos="3053">
+        <p15:guide id="7" pos="3053">
           <p15:clr>
             <a:srgbClr val="5ACBF0"/>
           </p15:clr>
         </p15:guide>
-        <p15:guide id="4294967295" pos="3629">
+        <p15:guide id="8" pos="3629">
           <p15:clr>
             <a:srgbClr val="5ACBF0"/>
           </p15:clr>
         </p15:guide>
-        <p15:guide id="4294967295" pos="4205">
+        <p15:guide id="9" pos="4205">
           <p15:clr>
             <a:srgbClr val="5ACBF0"/>
           </p15:clr>
         </p15:guide>
-        <p15:guide id="4294967295" pos="4781">
+        <p15:guide id="10" pos="4781">
           <p15:clr>
             <a:srgbClr val="5ACBF0"/>
           </p15:clr>
         </p15:guide>
-        <p15:guide id="4294967295" pos="5357">
+        <p15:guide id="11" pos="5357">
           <p15:clr>
             <a:srgbClr val="5ACBF0"/>
           </p15:clr>
         </p15:guide>
-        <p15:guide id="4294967295" pos="5933">
+        <p15:guide id="12" pos="5933">
           <p15:clr>
             <a:srgbClr val="5ACBF0"/>
           </p15:clr>
         </p15:guide>
-        <p15:guide id="4294967295" pos="6509">
+        <p15:guide id="13" pos="6509">
           <p15:clr>
             <a:srgbClr val="5ACBF0"/>
           </p15:clr>
         </p15:guide>
-        <p15:guide id="4294967295" pos="7085">
+        <p15:guide id="14" pos="7085">
           <p15:clr>
             <a:srgbClr val="5ACBF0"/>
           </p15:clr>
         </p15:guide>
-        <p15:guide id="4294967295" pos="7661">
+        <p15:guide id="15" pos="7661">
           <p15:clr>
             <a:srgbClr val="5ACBF0"/>
           </p15:clr>
         </p15:guide>
-        <p15:guide id="4294967295" pos="288">
+        <p15:guide id="16" pos="288">
           <p15:clr>
             <a:srgbClr val="C35EA4"/>
           </p15:clr>
         </p15:guide>
-        <p15:guide id="4294967295" pos="7546">
+        <p15:guide id="17" pos="7546">
           <p15:clr>
             <a:srgbClr val="C35EA4"/>
           </p15:clr>
         </p15:guide>
-        <p15:guide id="4294967295" orient="horz" pos="763">
+        <p15:guide id="18" orient="horz" pos="763">
           <p15:clr>
             <a:srgbClr val="5ACBF0"/>
           </p15:clr>
         </p15:guide>
-        <p15:guide id="4294967295" orient="horz" pos="1339">
+        <p15:guide id="19" orient="horz" pos="1339">
           <p15:clr>
             <a:srgbClr val="5ACBF0"/>
           </p15:clr>
         </p15:guide>
-        <p15:guide id="4294967295" orient="horz" pos="1915">
+        <p15:guide id="20" orient="horz" pos="1915">
           <p15:clr>
             <a:srgbClr val="5ACBF0"/>
           </p15:clr>
         </p15:guide>
-        <p15:guide id="4294967295" orient="horz" pos="2491">
+        <p15:guide id="21" orient="horz" pos="2491">
           <p15:clr>
             <a:srgbClr val="5ACBF0"/>
           </p15:clr>
         </p15:guide>
-        <p15:guide id="4294967295" orient="horz" pos="3067">
+        <p15:guide id="22" orient="horz" pos="3067">
           <p15:clr>
             <a:srgbClr val="5ACBF0"/>
           </p15:clr>
         </p15:guide>
-        <p15:guide id="4294967295" orient="horz" pos="3643">
+        <p15:guide id="23" orient="horz" pos="3643">
           <p15:clr>
             <a:srgbClr val="5ACBF0"/>
           </p15:clr>
         </p15:guide>
-        <p15:guide id="4294967295" orient="horz" pos="4219">
+        <p15:guide id="24" orient="horz" pos="4219">
           <p15:clr>
             <a:srgbClr val="5ACBF0"/>
           </p15:clr>
         </p15:guide>
-        <p15:guide id="4294967295" orient="horz" pos="302">
+        <p15:guide id="25" orient="horz" pos="302">
           <p15:clr>
             <a:srgbClr val="C35EA4"/>
           </p15:clr>
         </p15:guide>
-        <p15:guide id="4294967295" orient="horz" pos="4104">
+        <p15:guide id="26" orient="horz" pos="4104">
           <p15:clr>
             <a:srgbClr val="C35EA4"/>
           </p15:clr>
@@ -17667,132 +17667,132 @@
   <p:extLst mod="1">
     <p:ext uri="{27BBF7A9-308A-43DC-89C8-2F10F3537804}">
       <p15:sldGuideLst xmlns:p15="http://schemas.microsoft.com/office/powerpoint/2012/main">
-        <p15:guide id="4294967295" orient="horz" pos="187">
+        <p15:guide id="1" orient="horz" pos="187">
           <p15:clr>
             <a:srgbClr val="5ACBF0"/>
           </p15:clr>
         </p15:guide>
-        <p15:guide id="4294967295" pos="173">
+        <p15:guide id="2" pos="173">
           <p15:clr>
             <a:srgbClr val="5ACBF0"/>
           </p15:clr>
         </p15:guide>
-        <p15:guide id="4294967295" pos="749">
+        <p15:guide id="3" pos="749">
           <p15:clr>
             <a:srgbClr val="5ACBF0"/>
           </p15:clr>
         </p15:guide>
-        <p15:guide id="4294967295" pos="1325">
+        <p15:guide id="4" pos="1325">
           <p15:clr>
             <a:srgbClr val="5ACBF0"/>
           </p15:clr>
         </p15:guide>
-        <p15:guide id="4294967295" pos="1901">
+        <p15:guide id="5" pos="1901">
           <p15:clr>
             <a:srgbClr val="5ACBF0"/>
           </p15:clr>
         </p15:guide>
-        <p15:guide id="4294967295" pos="2477">
+        <p15:guide id="6" pos="2477">
           <p15:clr>
             <a:srgbClr val="5ACBF0"/>
           </p15:clr>
         </p15:guide>
-        <p15:guide id="4294967295" pos="3053">
+        <p15:guide id="7" pos="3053">
           <p15:clr>
             <a:srgbClr val="5ACBF0"/>
           </p15:clr>
         </p15:guide>
-        <p15:guide id="4294967295" pos="3629">
+        <p15:guide id="8" pos="3629">
           <p15:clr>
             <a:srgbClr val="5ACBF0"/>
           </p15:clr>
         </p15:guide>
-        <p15:guide id="4294967295" pos="4205">
+        <p15:guide id="9" pos="4205">
           <p15:clr>
             <a:srgbClr val="5ACBF0"/>
           </p15:clr>
         </p15:guide>
-        <p15:guide id="4294967295" pos="4781">
+        <p15:guide id="10" pos="4781">
           <p15:clr>
             <a:srgbClr val="5ACBF0"/>
           </p15:clr>
         </p15:guide>
-        <p15:guide id="4294967295" pos="5357">
+        <p15:guide id="11" pos="5357">
           <p15:clr>
             <a:srgbClr val="5ACBF0"/>
           </p15:clr>
         </p15:guide>
-        <p15:guide id="4294967295" pos="5933">
+        <p15:guide id="12" pos="5933">
           <p15:clr>
             <a:srgbClr val="5ACBF0"/>
           </p15:clr>
         </p15:guide>
-        <p15:guide id="4294967295" pos="6509">
+        <p15:guide id="13" pos="6509">
           <p15:clr>
             <a:srgbClr val="5ACBF0"/>
           </p15:clr>
         </p15:guide>
-        <p15:guide id="4294967295" pos="7085">
+        <p15:guide id="14" pos="7085">
           <p15:clr>
             <a:srgbClr val="5ACBF0"/>
           </p15:clr>
         </p15:guide>
-        <p15:guide id="4294967295" pos="7661">
+        <p15:guide id="15" pos="7661">
           <p15:clr>
             <a:srgbClr val="5ACBF0"/>
           </p15:clr>
         </p15:guide>
-        <p15:guide id="4294967295" pos="288">
+        <p15:guide id="16" pos="288">
           <p15:clr>
             <a:srgbClr val="C35EA4"/>
           </p15:clr>
         </p15:guide>
-        <p15:guide id="4294967295" pos="7546">
+        <p15:guide id="17" pos="7546">
           <p15:clr>
             <a:srgbClr val="C35EA4"/>
           </p15:clr>
         </p15:guide>
-        <p15:guide id="4294967295" orient="horz" pos="763">
+        <p15:guide id="18" orient="horz" pos="763">
           <p15:clr>
             <a:srgbClr val="5ACBF0"/>
           </p15:clr>
         </p15:guide>
-        <p15:guide id="4294967295" orient="horz" pos="1339">
+        <p15:guide id="19" orient="horz" pos="1339">
           <p15:clr>
             <a:srgbClr val="5ACBF0"/>
           </p15:clr>
         </p15:guide>
-        <p15:guide id="4294967295" orient="horz" pos="1915">
+        <p15:guide id="20" orient="horz" pos="1915">
           <p15:clr>
             <a:srgbClr val="5ACBF0"/>
           </p15:clr>
         </p15:guide>
-        <p15:guide id="4294967295" orient="horz" pos="2491">
+        <p15:guide id="21" orient="horz" pos="2491">
           <p15:clr>
             <a:srgbClr val="5ACBF0"/>
           </p15:clr>
         </p15:guide>
-        <p15:guide id="4294967295" orient="horz" pos="3067">
+        <p15:guide id="22" orient="horz" pos="3067">
           <p15:clr>
             <a:srgbClr val="5ACBF0"/>
           </p15:clr>
         </p15:guide>
-        <p15:guide id="4294967295" orient="horz" pos="3643">
+        <p15:guide id="23" orient="horz" pos="3643">
           <p15:clr>
             <a:srgbClr val="5ACBF0"/>
           </p15:clr>
         </p15:guide>
-        <p15:guide id="4294967295" orient="horz" pos="4219">
+        <p15:guide id="24" orient="horz" pos="4219">
           <p15:clr>
             <a:srgbClr val="5ACBF0"/>
           </p15:clr>
         </p15:guide>
-        <p15:guide id="4294967295" orient="horz" pos="302">
+        <p15:guide id="25" orient="horz" pos="302">
           <p15:clr>
             <a:srgbClr val="C35EA4"/>
           </p15:clr>
         </p15:guide>
-        <p15:guide id="4294967295" orient="horz" pos="4104">
+        <p15:guide id="26" orient="horz" pos="4104">
           <p15:clr>
             <a:srgbClr val="C35EA4"/>
           </p15:clr>
@@ -23696,7 +23696,7 @@
         <p:spPr>
           <a:xfrm>
             <a:off x="249716" y="5526573"/>
-            <a:ext cx="2277720" cy="452590"/>
+            <a:ext cx="2619100" cy="566656"/>
           </a:xfrm>
           <a:prstGeom prst="rect">
             <a:avLst/>
@@ -23718,15 +23718,42 @@
               </a:spcAft>
             </a:pPr>
             <a:r>
-              <a:rPr lang="en-US" sz="1176" dirty="0">
+              <a:rPr lang="en-US" sz="2000" dirty="0" err="1" smtClean="0">
                 <a:solidFill>
                   <a:srgbClr val="11CCFF"/>
                 </a:solidFill>
                 <a:latin typeface="Consolas" panose="020B0609020204030204" pitchFamily="49" charset="0"/>
                 <a:cs typeface="Consolas" panose="020B0609020204030204" pitchFamily="49" charset="0"/>
               </a:rPr>
-              <a:t>http://aka.ms/docdbsdks</a:t>
-            </a:r>
+              <a:t>aka.ms</a:t>
+            </a:r>
+            <a:r>
+              <a:rPr lang="en-US" sz="2000" dirty="0" smtClean="0">
+                <a:solidFill>
+                  <a:srgbClr val="11CCFF"/>
+                </a:solidFill>
+                <a:latin typeface="Consolas" panose="020B0609020204030204" pitchFamily="49" charset="0"/>
+                <a:cs typeface="Consolas" panose="020B0609020204030204" pitchFamily="49" charset="0"/>
+              </a:rPr>
+              <a:t>/</a:t>
+            </a:r>
+            <a:r>
+              <a:rPr lang="en-US" sz="2000" dirty="0" err="1" smtClean="0">
+                <a:solidFill>
+                  <a:srgbClr val="11CCFF"/>
+                </a:solidFill>
+                <a:latin typeface="Consolas" panose="020B0609020204030204" pitchFamily="49" charset="0"/>
+                <a:cs typeface="Consolas" panose="020B0609020204030204" pitchFamily="49" charset="0"/>
+              </a:rPr>
+              <a:t>docdbsdks</a:t>
+            </a:r>
+            <a:endParaRPr lang="en-US" sz="2000" dirty="0">
+              <a:solidFill>
+                <a:srgbClr val="11CCFF"/>
+              </a:solidFill>
+              <a:latin typeface="Consolas" panose="020B0609020204030204" pitchFamily="49" charset="0"/>
+              <a:cs typeface="Consolas" panose="020B0609020204030204" pitchFamily="49" charset="0"/>
+            </a:endParaRPr>
           </a:p>
         </p:txBody>
       </p:sp>
@@ -23738,8 +23765,8 @@
         </p:nvSpPr>
         <p:spPr>
           <a:xfrm>
-            <a:off x="3493771" y="5526572"/>
-            <a:ext cx="2277720" cy="452590"/>
+            <a:off x="3112765" y="5526573"/>
+            <a:ext cx="2619100" cy="566656"/>
           </a:xfrm>
           <a:prstGeom prst="rect">
             <a:avLst/>
@@ -23761,15 +23788,22 @@
               </a:spcAft>
             </a:pPr>
             <a:r>
-              <a:rPr lang="en-US" sz="1176" dirty="0">
+              <a:rPr lang="en-US" sz="2000" dirty="0" err="1" smtClean="0">
                 <a:solidFill>
                   <a:srgbClr val="11CCFF"/>
                 </a:solidFill>
                 <a:latin typeface="Consolas" panose="020B0609020204030204" pitchFamily="49" charset="0"/>
                 <a:cs typeface="Consolas" panose="020B0609020204030204" pitchFamily="49" charset="0"/>
               </a:rPr>
-              <a:t>http://portal.azure.com</a:t>
-            </a:r>
+              <a:t>portal.azure.com</a:t>
+            </a:r>
+            <a:endParaRPr lang="en-US" sz="2000" dirty="0">
+              <a:solidFill>
+                <a:srgbClr val="11CCFF"/>
+              </a:solidFill>
+              <a:latin typeface="Consolas" panose="020B0609020204030204" pitchFamily="49" charset="0"/>
+              <a:cs typeface="Consolas" panose="020B0609020204030204" pitchFamily="49" charset="0"/>
+            </a:endParaRPr>
           </a:p>
         </p:txBody>
       </p:sp>
@@ -23781,8 +23815,8 @@
         </p:nvSpPr>
         <p:spPr>
           <a:xfrm>
-            <a:off x="6497396" y="5508683"/>
-            <a:ext cx="2444298" cy="452590"/>
+            <a:off x="5975814" y="5526573"/>
+            <a:ext cx="2901228" cy="566656"/>
           </a:xfrm>
           <a:prstGeom prst="rect">
             <a:avLst/>
@@ -23804,15 +23838,42 @@
               </a:spcAft>
             </a:pPr>
             <a:r>
-              <a:rPr lang="en-US" sz="1176" dirty="0">
+              <a:rPr lang="en-US" sz="2000" dirty="0" err="1" smtClean="0">
                 <a:solidFill>
                   <a:srgbClr val="11CCFF"/>
                 </a:solidFill>
                 <a:latin typeface="Consolas" panose="020B0609020204030204" pitchFamily="49" charset="0"/>
                 <a:cs typeface="Consolas" panose="020B0609020204030204" pitchFamily="49" charset="0"/>
               </a:rPr>
-              <a:t>http://aka.ms/docdbstudio</a:t>
-            </a:r>
+              <a:t>aka.ms</a:t>
+            </a:r>
+            <a:r>
+              <a:rPr lang="en-US" sz="2000" dirty="0" smtClean="0">
+                <a:solidFill>
+                  <a:srgbClr val="11CCFF"/>
+                </a:solidFill>
+                <a:latin typeface="Consolas" panose="020B0609020204030204" pitchFamily="49" charset="0"/>
+                <a:cs typeface="Consolas" panose="020B0609020204030204" pitchFamily="49" charset="0"/>
+              </a:rPr>
+              <a:t>/</a:t>
+            </a:r>
+            <a:r>
+              <a:rPr lang="en-US" sz="2000" dirty="0" err="1" smtClean="0">
+                <a:solidFill>
+                  <a:srgbClr val="11CCFF"/>
+                </a:solidFill>
+                <a:latin typeface="Consolas" panose="020B0609020204030204" pitchFamily="49" charset="0"/>
+                <a:cs typeface="Consolas" panose="020B0609020204030204" pitchFamily="49" charset="0"/>
+              </a:rPr>
+              <a:t>docdbstudio</a:t>
+            </a:r>
+            <a:endParaRPr lang="en-US" sz="2000" dirty="0">
+              <a:solidFill>
+                <a:srgbClr val="11CCFF"/>
+              </a:solidFill>
+              <a:latin typeface="Consolas" panose="020B0609020204030204" pitchFamily="49" charset="0"/>
+              <a:cs typeface="Consolas" panose="020B0609020204030204" pitchFamily="49" charset="0"/>
+            </a:endParaRPr>
           </a:p>
         </p:txBody>
       </p:sp>
@@ -23824,8 +23885,8 @@
         </p:nvSpPr>
         <p:spPr>
           <a:xfrm>
-            <a:off x="9596308" y="5484621"/>
-            <a:ext cx="2444298" cy="452590"/>
+            <a:off x="9120992" y="5526573"/>
+            <a:ext cx="2901228" cy="566656"/>
           </a:xfrm>
           <a:prstGeom prst="rect">
             <a:avLst/>
@@ -23847,15 +23908,42 @@
               </a:spcAft>
             </a:pPr>
             <a:r>
-              <a:rPr lang="en-US" sz="1176" dirty="0">
+              <a:rPr lang="en-US" sz="2000" dirty="0" err="1" smtClean="0">
                 <a:solidFill>
                   <a:srgbClr val="11CCFF"/>
                 </a:solidFill>
                 <a:latin typeface="Consolas" panose="020B0609020204030204" pitchFamily="49" charset="0"/>
                 <a:cs typeface="Consolas" panose="020B0609020204030204" pitchFamily="49" charset="0"/>
               </a:rPr>
-              <a:t>http://aka.ms/docdbimport</a:t>
-            </a:r>
+              <a:t>aka.ms</a:t>
+            </a:r>
+            <a:r>
+              <a:rPr lang="en-US" sz="2000" dirty="0" smtClean="0">
+                <a:solidFill>
+                  <a:srgbClr val="11CCFF"/>
+                </a:solidFill>
+                <a:latin typeface="Consolas" panose="020B0609020204030204" pitchFamily="49" charset="0"/>
+                <a:cs typeface="Consolas" panose="020B0609020204030204" pitchFamily="49" charset="0"/>
+              </a:rPr>
+              <a:t>/</a:t>
+            </a:r>
+            <a:r>
+              <a:rPr lang="en-US" sz="2000" dirty="0" err="1" smtClean="0">
+                <a:solidFill>
+                  <a:srgbClr val="11CCFF"/>
+                </a:solidFill>
+                <a:latin typeface="Consolas" panose="020B0609020204030204" pitchFamily="49" charset="0"/>
+                <a:cs typeface="Consolas" panose="020B0609020204030204" pitchFamily="49" charset="0"/>
+              </a:rPr>
+              <a:t>docdbimport</a:t>
+            </a:r>
+            <a:endParaRPr lang="en-US" sz="2000" dirty="0">
+              <a:solidFill>
+                <a:srgbClr val="11CCFF"/>
+              </a:solidFill>
+              <a:latin typeface="Consolas" panose="020B0609020204030204" pitchFamily="49" charset="0"/>
+              <a:cs typeface="Consolas" panose="020B0609020204030204" pitchFamily="49" charset="0"/>
+            </a:endParaRPr>
           </a:p>
         </p:txBody>
       </p:sp>
@@ -25522,11 +25610,7 @@
           <a:p>
             <a:r>
               <a:rPr lang="en-US" dirty="0" smtClean="0"/>
-              <a:t>Team </a:t>
-            </a:r>
-            <a:r>
-              <a:rPr lang="en-US" dirty="0" smtClean="0"/>
-              <a:t>blog - </a:t>
+              <a:t>Team blog - </a:t>
             </a:r>
             <a:r>
               <a:rPr lang="en-US" dirty="0">
@@ -25573,11 +25657,11 @@
   <p:clrMapOvr>
     <a:masterClrMapping/>
   </p:clrMapOvr>
-  <mc:AlternateContent xmlns:mc="http://schemas.openxmlformats.org/markup-compatibility/2006">
-    <mc:Choice xmlns:p14="http://schemas.microsoft.com/office/powerpoint/2010/main" Requires="p14">
+  <mc:AlternateContent xmlns:mc="http://schemas.openxmlformats.org/markup-compatibility/2006" xmlns:p14="http://schemas.microsoft.com/office/powerpoint/2010/main">
+    <mc:Choice Requires="p14">
       <p:transition spd="slow" p14:dur="2000"/>
     </mc:Choice>
-    <mc:Fallback>
+    <mc:Fallback xmlns="">
       <p:transition spd="slow"/>
     </mc:Fallback>
   </mc:AlternateContent>
@@ -25648,15 +25732,7 @@
           <a:p>
             <a:r>
               <a:rPr lang="en-US" dirty="0" smtClean="0"/>
-              <a:t>What is DocumentDB?  </a:t>
-            </a:r>
-            <a:r>
-              <a:rPr lang="en-US" dirty="0" smtClean="0"/>
-              <a:t>(5-minute </a:t>
-            </a:r>
-            <a:r>
-              <a:rPr lang="en-US" dirty="0" smtClean="0"/>
-              <a:t>lightning-round edition)</a:t>
+              <a:t>What is DocumentDB?  (5-minute lightning-round edition)</a:t>
             </a:r>
           </a:p>
           <a:p>
@@ -25843,21 +25919,8 @@
                 <a:ea typeface="Lucida Console" charset="0"/>
                 <a:cs typeface="Lucida Console" charset="0"/>
               </a:rPr>
-              <a:t>: "Service</a:t>
-            </a:r>
-            <a:r>
-              <a:rPr lang="en-US" sz="2400" dirty="0" smtClean="0">
-                <a:latin typeface="Lucida Console" charset="0"/>
-                <a:ea typeface="Lucida Console" charset="0"/>
-                <a:cs typeface="Lucida Console" charset="0"/>
-              </a:rPr>
-              <a:t>",</a:t>
-            </a:r>
-            <a:endParaRPr lang="en-US" sz="2400" dirty="0" smtClean="0">
-              <a:latin typeface="Lucida Console" charset="0"/>
-              <a:ea typeface="Lucida Console" charset="0"/>
-              <a:cs typeface="Lucida Console" charset="0"/>
-            </a:endParaRPr>
+              <a:t>: "Service",</a:t>
+            </a:r>
           </a:p>
           <a:p>
             <a:pPr marL="0" indent="0">
@@ -25959,23 +26022,7 @@
                 <a:ea typeface="Lucida Console" charset="0"/>
                 <a:cs typeface="Lucida Console" charset="0"/>
               </a:rPr>
-              <a:t>: [ "portal", "rest</a:t>
-            </a:r>
-            <a:r>
-              <a:rPr lang="en-US" sz="2400" dirty="0" smtClean="0">
-                <a:latin typeface="Lucida Console" charset="0"/>
-                <a:ea typeface="Lucida Console" charset="0"/>
-                <a:cs typeface="Lucida Console" charset="0"/>
-              </a:rPr>
-              <a:t>", "cli" </a:t>
-            </a:r>
-            <a:r>
-              <a:rPr lang="en-US" sz="2400" dirty="0" smtClean="0">
-                <a:latin typeface="Lucida Console" charset="0"/>
-                <a:ea typeface="Lucida Console" charset="0"/>
-                <a:cs typeface="Lucida Console" charset="0"/>
-              </a:rPr>
-              <a:t>],</a:t>
+              <a:t>: [ "portal", "rest", "cli" ],</a:t>
             </a:r>
           </a:p>
           <a:p>
@@ -26004,15 +26051,7 @@
                 <a:ea typeface="Lucida Console" charset="0"/>
                 <a:cs typeface="Lucida Console" charset="0"/>
               </a:rPr>
-              <a:t>:  [ "portal", "rest", "</a:t>
-            </a:r>
-            <a:r>
-              <a:rPr lang="en-US" sz="2400" dirty="0" smtClean="0">
-                <a:latin typeface="Lucida Console" charset="0"/>
-                <a:ea typeface="Lucida Console" charset="0"/>
-                <a:cs typeface="Lucida Console" charset="0"/>
-              </a:rPr>
-              <a:t>cli" ],</a:t>
+              <a:t>:  [ "portal", "rest", "cli" ],</a:t>
             </a:r>
             <a:br>
               <a:rPr lang="en-US" sz="2400" dirty="0" smtClean="0">
@@ -26061,11 +26100,6 @@
               </a:rPr>
               <a:t>", "indexing", "consistency" ]</a:t>
             </a:r>
-            <a:endParaRPr lang="en-US" sz="2400" dirty="0" smtClean="0">
-              <a:latin typeface="Lucida Console" charset="0"/>
-              <a:ea typeface="Lucida Console" charset="0"/>
-              <a:cs typeface="Lucida Console" charset="0"/>
-            </a:endParaRPr>
           </a:p>
           <a:p>
             <a:pPr marL="0" indent="0">
@@ -29589,30 +29623,14 @@
             <a:p>
               <a:r>
                 <a:rPr lang="en-US" sz="1100" dirty="0" smtClean="0"/>
-                <a:t>  </a:t>
-              </a:r>
-              <a:r>
-                <a:rPr lang="en-US" sz="1100" dirty="0" smtClean="0"/>
-                <a:t> “</a:t>
-              </a:r>
-              <a:r>
-                <a:rPr lang="en-US" sz="1100" dirty="0" smtClean="0"/>
-                <a:t>id” : “123”</a:t>
+                <a:t>   “id” : “123”</a:t>
               </a:r>
               <a:br>
                 <a:rPr lang="en-US" sz="1100" dirty="0" smtClean="0"/>
               </a:br>
               <a:r>
                 <a:rPr lang="en-US" sz="1100" dirty="0" smtClean="0"/>
-                <a:t>  </a:t>
-              </a:r>
-              <a:r>
-                <a:rPr lang="en-US" sz="1100" dirty="0" smtClean="0"/>
-                <a:t> “</a:t>
-              </a:r>
-              <a:r>
-                <a:rPr lang="en-US" sz="1100" dirty="0" smtClean="0"/>
-                <a:t>name” : “joe”</a:t>
+                <a:t>   “name” : “joe”</a:t>
               </a:r>
             </a:p>
             <a:p>
@@ -29622,15 +29640,7 @@
               </a:r>
               <a:r>
                 <a:rPr lang="en-US" sz="1100" dirty="0" smtClean="0"/>
-                <a:t> </a:t>
-              </a:r>
-              <a:r>
-                <a:rPr lang="en-US" sz="1100" dirty="0" smtClean="0"/>
-                <a:t>  “</a:t>
-              </a:r>
-              <a:r>
-                <a:rPr lang="en-US" sz="1100" dirty="0" smtClean="0"/>
-                <a:t>age” : 30</a:t>
+                <a:t>   “age” : 30</a:t>
               </a:r>
             </a:p>
             <a:p>
@@ -29640,15 +29650,7 @@
               </a:r>
               <a:r>
                 <a:rPr lang="en-US" sz="1100" dirty="0" smtClean="0"/>
-                <a:t> </a:t>
-              </a:r>
-              <a:r>
-                <a:rPr lang="en-US" sz="1100" dirty="0" smtClean="0"/>
-                <a:t>   “</a:t>
-              </a:r>
-              <a:r>
-                <a:rPr lang="en-US" sz="1100" dirty="0" smtClean="0"/>
-                <a:t>address” : {</a:t>
+                <a:t>    “address” : {</a:t>
               </a:r>
             </a:p>
             <a:p>
@@ -29658,15 +29660,7 @@
               </a:r>
               <a:r>
                 <a:rPr lang="en-US" sz="1100" dirty="0" smtClean="0"/>
-                <a:t>   </a:t>
-              </a:r>
-              <a:r>
-                <a:rPr lang="en-US" sz="1100" dirty="0" smtClean="0"/>
-                <a:t>      “</a:t>
-              </a:r>
-              <a:r>
-                <a:rPr lang="en-US" sz="1100" dirty="0" smtClean="0"/>
-                <a:t>street” : “some st”</a:t>
+                <a:t>         “street” : “some st”</a:t>
               </a:r>
             </a:p>
             <a:p>
@@ -29676,11 +29670,7 @@
               </a:r>
               <a:r>
                 <a:rPr lang="en-US" sz="1100" dirty="0" smtClean="0"/>
-                <a:t> </a:t>
-              </a:r>
-              <a:r>
-                <a:rPr lang="en-US" sz="1100" dirty="0" smtClean="0"/>
-                <a:t>     }</a:t>
+                <a:t>      }</a:t>
               </a:r>
               <a:endParaRPr lang="en-US" sz="1100" dirty="0"/>
             </a:p>
@@ -33694,13 +33684,13 @@
   <p:clrMapOvr>
     <a:masterClrMapping/>
   </p:clrMapOvr>
-  <mc:AlternateContent xmlns:mc="http://schemas.openxmlformats.org/markup-compatibility/2006">
-    <mc:Choice xmlns:p14="http://schemas.microsoft.com/office/powerpoint/2010/main" Requires="p14">
+  <mc:AlternateContent xmlns:mc="http://schemas.openxmlformats.org/markup-compatibility/2006" xmlns:p14="http://schemas.microsoft.com/office/powerpoint/2010/main">
+    <mc:Choice Requires="p14">
       <p:transition spd="med" p14:dur="700">
         <p:fade/>
       </p:transition>
     </mc:Choice>
-    <mc:Fallback>
+    <mc:Fallback xmlns="">
       <p:transition spd="med">
         <p:fade/>
       </p:transition>

</xml_diff>

<commit_message>
added a gray area
</commit_message>
<xml_diff>
--- a/indexing-nirvana.pptx
+++ b/indexing-nirvana.pptx
@@ -207,7 +207,7 @@
           <a:p>
             <a:fld id="{554481DA-44F1-3746-B19A-AB72460DEAAC}" type="datetimeFigureOut">
               <a:rPr lang="en-US" smtClean="0"/>
-              <a:t>8/12/2015</a:t>
+              <a:t>8/13/15</a:t>
             </a:fld>
             <a:endParaRPr lang="en-US"/>
           </a:p>
@@ -805,7 +805,7 @@
                 </a:solidFill>
               </a:rPr>
               <a:pPr/>
-              <a:t>8/12/2015 12:51</a:t>
+              <a:t>8/13/15 12:57 PM</a:t>
             </a:fld>
             <a:endParaRPr lang="en-US" dirty="0">
               <a:solidFill>
@@ -1102,7 +1102,7 @@
                 </a:solidFill>
               </a:rPr>
               <a:pPr/>
-              <a:t>8/12/2015 12:36</a:t>
+              <a:t>8/13/15 12:57 PM</a:t>
             </a:fld>
             <a:endParaRPr lang="en-US" dirty="0">
               <a:solidFill>
@@ -1355,7 +1355,7 @@
                 </a:solidFill>
               </a:rPr>
               <a:pPr/>
-              <a:t>8/12/2015 12:36</a:t>
+              <a:t>8/13/15 12:57 PM</a:t>
             </a:fld>
             <a:endParaRPr lang="en-US" dirty="0">
               <a:solidFill>
@@ -1565,7 +1565,7 @@
                 </a:solidFill>
               </a:rPr>
               <a:pPr/>
-              <a:t>8/12/2015 12:36</a:t>
+              <a:t>8/13/15 12:57 PM</a:t>
             </a:fld>
             <a:endParaRPr lang="en-US" dirty="0">
               <a:solidFill>
@@ -1751,7 +1751,7 @@
           <a:p>
             <a:fld id="{B15FBB8C-084E-354C-BBCD-E95225EFA9A1}" type="datetimeFigureOut">
               <a:rPr lang="en-US" smtClean="0"/>
-              <a:t>8/12/2015</a:t>
+              <a:t>8/13/15</a:t>
             </a:fld>
             <a:endParaRPr lang="en-US"/>
           </a:p>
@@ -1921,7 +1921,7 @@
           <a:p>
             <a:fld id="{B15FBB8C-084E-354C-BBCD-E95225EFA9A1}" type="datetimeFigureOut">
               <a:rPr lang="en-US" smtClean="0"/>
-              <a:t>8/12/2015</a:t>
+              <a:t>8/13/15</a:t>
             </a:fld>
             <a:endParaRPr lang="en-US"/>
           </a:p>
@@ -2101,7 +2101,7 @@
           <a:p>
             <a:fld id="{B15FBB8C-084E-354C-BBCD-E95225EFA9A1}" type="datetimeFigureOut">
               <a:rPr lang="en-US" smtClean="0"/>
-              <a:t>8/12/2015</a:t>
+              <a:t>8/13/15</a:t>
             </a:fld>
             <a:endParaRPr lang="en-US"/>
           </a:p>
@@ -4049,7 +4049,7 @@
           <a:p>
             <a:fld id="{B15FBB8C-084E-354C-BBCD-E95225EFA9A1}" type="datetimeFigureOut">
               <a:rPr lang="en-US" smtClean="0"/>
-              <a:t>8/12/2015</a:t>
+              <a:t>8/13/15</a:t>
             </a:fld>
             <a:endParaRPr lang="en-US"/>
           </a:p>
@@ -6061,7 +6061,7 @@
           <a:p>
             <a:fld id="{B15FBB8C-084E-354C-BBCD-E95225EFA9A1}" type="datetimeFigureOut">
               <a:rPr lang="en-US" smtClean="0"/>
-              <a:t>8/12/2015</a:t>
+              <a:t>8/13/15</a:t>
             </a:fld>
             <a:endParaRPr lang="en-US"/>
           </a:p>
@@ -7873,7 +7873,7 @@
           <a:p>
             <a:fld id="{B15FBB8C-084E-354C-BBCD-E95225EFA9A1}" type="datetimeFigureOut">
               <a:rPr lang="en-US" smtClean="0"/>
-              <a:t>8/12/2015</a:t>
+              <a:t>8/13/15</a:t>
             </a:fld>
             <a:endParaRPr lang="en-US"/>
           </a:p>
@@ -10400,7 +10400,7 @@
           <a:p>
             <a:fld id="{B15FBB8C-084E-354C-BBCD-E95225EFA9A1}" type="datetimeFigureOut">
               <a:rPr lang="en-US" smtClean="0"/>
-              <a:t>8/12/2015</a:t>
+              <a:t>8/13/15</a:t>
             </a:fld>
             <a:endParaRPr lang="en-US"/>
           </a:p>
@@ -12284,7 +12284,7 @@
           <a:p>
             <a:fld id="{B15FBB8C-084E-354C-BBCD-E95225EFA9A1}" type="datetimeFigureOut">
               <a:rPr lang="en-US" smtClean="0"/>
-              <a:t>8/12/2015</a:t>
+              <a:t>8/13/15</a:t>
             </a:fld>
             <a:endParaRPr lang="en-US"/>
           </a:p>
@@ -13959,7 +13959,7 @@
           <a:p>
             <a:fld id="{B15FBB8C-084E-354C-BBCD-E95225EFA9A1}" type="datetimeFigureOut">
               <a:rPr lang="en-US" smtClean="0"/>
-              <a:t>8/12/2015</a:t>
+              <a:t>8/13/15</a:t>
             </a:fld>
             <a:endParaRPr lang="en-US"/>
           </a:p>
@@ -14792,7 +14792,7 @@
           <a:p>
             <a:fld id="{B15FBB8C-084E-354C-BBCD-E95225EFA9A1}" type="datetimeFigureOut">
               <a:rPr lang="en-US" smtClean="0"/>
-              <a:t>8/12/2015</a:t>
+              <a:t>8/13/15</a:t>
             </a:fld>
             <a:endParaRPr lang="en-US"/>
           </a:p>
@@ -15045,7 +15045,7 @@
           <a:p>
             <a:fld id="{B15FBB8C-084E-354C-BBCD-E95225EFA9A1}" type="datetimeFigureOut">
               <a:rPr lang="en-US" smtClean="0"/>
-              <a:t>8/12/2015</a:t>
+              <a:t>8/13/15</a:t>
             </a:fld>
             <a:endParaRPr lang="en-US"/>
           </a:p>
@@ -15258,7 +15258,7 @@
           <a:p>
             <a:fld id="{B15FBB8C-084E-354C-BBCD-E95225EFA9A1}" type="datetimeFigureOut">
               <a:rPr lang="en-US" smtClean="0"/>
-              <a:t>8/12/2015</a:t>
+              <a:t>8/13/15</a:t>
             </a:fld>
             <a:endParaRPr lang="en-US"/>
           </a:p>
@@ -17386,6 +17386,54 @@
           </a:p>
           <a:p>
             <a:endParaRPr lang="en-US" dirty="0"/>
+          </a:p>
+        </p:txBody>
+      </p:sp>
+      <p:sp>
+        <p:nvSpPr>
+          <p:cNvPr id="4" name="Rectangle 3"/>
+          <p:cNvSpPr/>
+          <p:nvPr/>
+        </p:nvSpPr>
+        <p:spPr>
+          <a:xfrm>
+            <a:off x="8610600" y="3683000"/>
+            <a:ext cx="2235200" cy="1397000"/>
+          </a:xfrm>
+          <a:prstGeom prst="rect">
+            <a:avLst/>
+          </a:prstGeom>
+          <a:solidFill>
+            <a:schemeClr val="bg2"/>
+          </a:solidFill>
+          <a:ln>
+            <a:solidFill>
+              <a:schemeClr val="tx1"/>
+            </a:solidFill>
+          </a:ln>
+        </p:spPr>
+        <p:style>
+          <a:lnRef idx="2">
+            <a:schemeClr val="accent1">
+              <a:shade val="50000"/>
+            </a:schemeClr>
+          </a:lnRef>
+          <a:fillRef idx="1">
+            <a:schemeClr val="accent1"/>
+          </a:fillRef>
+          <a:effectRef idx="0">
+            <a:schemeClr val="accent1"/>
+          </a:effectRef>
+          <a:fontRef idx="minor">
+            <a:schemeClr val="lt1"/>
+          </a:fontRef>
+        </p:style>
+        <p:txBody>
+          <a:bodyPr rtlCol="0" anchor="ctr"/>
+          <a:lstStyle/>
+          <a:p>
+            <a:pPr algn="ctr"/>
+            <a:endParaRPr lang="en-US"/>
           </a:p>
         </p:txBody>
       </p:sp>
@@ -21058,11 +21106,7 @@
             <a:p>
               <a:r>
                 <a:rPr lang="en-US" sz="1600" dirty="0" smtClean="0"/>
-                <a:t>    </a:t>
-              </a:r>
-              <a:r>
-                <a:rPr lang="en-US" sz="1600" dirty="0" smtClean="0"/>
-                <a:t>“age” : 30</a:t>
+                <a:t>    “age” : 30</a:t>
               </a:r>
             </a:p>
             <a:p>
@@ -21228,19 +21272,6 @@
               </a:rPr>
               <a:t>1010100100</a:t>
             </a:r>
-            <a:endParaRPr lang="en-US" sz="500" dirty="0" smtClean="0">
-              <a:gradFill>
-                <a:gsLst>
-                  <a:gs pos="2917">
-                    <a:schemeClr val="tx1"/>
-                  </a:gs>
-                  <a:gs pos="30000">
-                    <a:schemeClr val="tx1"/>
-                  </a:gs>
-                </a:gsLst>
-                <a:lin ang="5400000" scaled="0"/>
-              </a:gradFill>
-            </a:endParaRPr>
           </a:p>
         </p:txBody>
       </p:sp>
@@ -21313,13 +21344,13 @@
   <p:clrMapOvr>
     <a:masterClrMapping/>
   </p:clrMapOvr>
-  <mc:AlternateContent xmlns:mc="http://schemas.openxmlformats.org/markup-compatibility/2006">
-    <mc:Choice xmlns:p14="http://schemas.microsoft.com/office/powerpoint/2010/main" Requires="p14">
+  <mc:AlternateContent xmlns:mc="http://schemas.openxmlformats.org/markup-compatibility/2006" xmlns:p14="http://schemas.microsoft.com/office/powerpoint/2010/main">
+    <mc:Choice Requires="p14">
       <p:transition spd="med" p14:dur="700">
         <p:fade/>
       </p:transition>
     </mc:Choice>
-    <mc:Fallback>
+    <mc:Fallback xmlns="">
       <p:transition spd="med">
         <p:fade/>
       </p:transition>
@@ -27711,24 +27742,7 @@
                   </a:gradFill>
                   <a:latin typeface="Segoe UI Light"/>
                 </a:rPr>
-                <a:t>move </a:t>
-              </a:r>
-              <a:r>
-                <a:rPr lang="en-US" sz="2400" dirty="0" smtClean="0">
-                  <a:gradFill>
-                    <a:gsLst>
-                      <a:gs pos="2917">
-                        <a:srgbClr val="FFFFFF"/>
-                      </a:gs>
-                      <a:gs pos="30000">
-                        <a:srgbClr val="FFFFFF"/>
-                      </a:gs>
-                    </a:gsLst>
-                    <a:lin ang="5400000" scaled="0"/>
-                  </a:gradFill>
-                  <a:latin typeface="Segoe UI Light"/>
-                </a:rPr>
-                <a:t>some </a:t>
+                <a:t>move some </a:t>
               </a:r>
               <a:r>
                 <a:rPr lang="en-US" sz="2400" dirty="0">

</xml_diff>

<commit_message>
updated pptx, cinema and showtimes data
</commit_message>
<xml_diff>
--- a/indexing-nirvana.pptx
+++ b/indexing-nirvana.pptx
@@ -207,7 +207,7 @@
           <a:p>
             <a:fld id="{554481DA-44F1-3746-B19A-AB72460DEAAC}" type="datetimeFigureOut">
               <a:rPr lang="en-US" smtClean="0"/>
-              <a:t>8/13/15</a:t>
+              <a:t>8/14/2015</a:t>
             </a:fld>
             <a:endParaRPr lang="en-US"/>
           </a:p>
@@ -805,7 +805,7 @@
                 </a:solidFill>
               </a:rPr>
               <a:pPr/>
-              <a:t>8/13/15 12:57 PM</a:t>
+              <a:t>8/14/2015 13:05</a:t>
             </a:fld>
             <a:endParaRPr lang="en-US" dirty="0">
               <a:solidFill>
@@ -1102,7 +1102,7 @@
                 </a:solidFill>
               </a:rPr>
               <a:pPr/>
-              <a:t>8/13/15 12:57 PM</a:t>
+              <a:t>8/14/2015 13:05</a:t>
             </a:fld>
             <a:endParaRPr lang="en-US" dirty="0">
               <a:solidFill>
@@ -1355,7 +1355,7 @@
                 </a:solidFill>
               </a:rPr>
               <a:pPr/>
-              <a:t>8/13/15 12:57 PM</a:t>
+              <a:t>8/14/2015 13:05</a:t>
             </a:fld>
             <a:endParaRPr lang="en-US" dirty="0">
               <a:solidFill>
@@ -1565,7 +1565,7 @@
                 </a:solidFill>
               </a:rPr>
               <a:pPr/>
-              <a:t>8/13/15 12:57 PM</a:t>
+              <a:t>8/14/2015 13:05</a:t>
             </a:fld>
             <a:endParaRPr lang="en-US" dirty="0">
               <a:solidFill>
@@ -1751,7 +1751,7 @@
           <a:p>
             <a:fld id="{B15FBB8C-084E-354C-BBCD-E95225EFA9A1}" type="datetimeFigureOut">
               <a:rPr lang="en-US" smtClean="0"/>
-              <a:t>8/13/15</a:t>
+              <a:t>8/14/2015</a:t>
             </a:fld>
             <a:endParaRPr lang="en-US"/>
           </a:p>
@@ -1921,7 +1921,7 @@
           <a:p>
             <a:fld id="{B15FBB8C-084E-354C-BBCD-E95225EFA9A1}" type="datetimeFigureOut">
               <a:rPr lang="en-US" smtClean="0"/>
-              <a:t>8/13/15</a:t>
+              <a:t>8/14/2015</a:t>
             </a:fld>
             <a:endParaRPr lang="en-US"/>
           </a:p>
@@ -2101,7 +2101,7 @@
           <a:p>
             <a:fld id="{B15FBB8C-084E-354C-BBCD-E95225EFA9A1}" type="datetimeFigureOut">
               <a:rPr lang="en-US" smtClean="0"/>
-              <a:t>8/13/15</a:t>
+              <a:t>8/14/2015</a:t>
             </a:fld>
             <a:endParaRPr lang="en-US"/>
           </a:p>
@@ -4049,7 +4049,7 @@
           <a:p>
             <a:fld id="{B15FBB8C-084E-354C-BBCD-E95225EFA9A1}" type="datetimeFigureOut">
               <a:rPr lang="en-US" smtClean="0"/>
-              <a:t>8/13/15</a:t>
+              <a:t>8/14/2015</a:t>
             </a:fld>
             <a:endParaRPr lang="en-US"/>
           </a:p>
@@ -6061,7 +6061,7 @@
           <a:p>
             <a:fld id="{B15FBB8C-084E-354C-BBCD-E95225EFA9A1}" type="datetimeFigureOut">
               <a:rPr lang="en-US" smtClean="0"/>
-              <a:t>8/13/15</a:t>
+              <a:t>8/14/2015</a:t>
             </a:fld>
             <a:endParaRPr lang="en-US"/>
           </a:p>
@@ -7873,7 +7873,7 @@
           <a:p>
             <a:fld id="{B15FBB8C-084E-354C-BBCD-E95225EFA9A1}" type="datetimeFigureOut">
               <a:rPr lang="en-US" smtClean="0"/>
-              <a:t>8/13/15</a:t>
+              <a:t>8/14/2015</a:t>
             </a:fld>
             <a:endParaRPr lang="en-US"/>
           </a:p>
@@ -10400,7 +10400,7 @@
           <a:p>
             <a:fld id="{B15FBB8C-084E-354C-BBCD-E95225EFA9A1}" type="datetimeFigureOut">
               <a:rPr lang="en-US" smtClean="0"/>
-              <a:t>8/13/15</a:t>
+              <a:t>8/14/2015</a:t>
             </a:fld>
             <a:endParaRPr lang="en-US"/>
           </a:p>
@@ -12284,7 +12284,7 @@
           <a:p>
             <a:fld id="{B15FBB8C-084E-354C-BBCD-E95225EFA9A1}" type="datetimeFigureOut">
               <a:rPr lang="en-US" smtClean="0"/>
-              <a:t>8/13/15</a:t>
+              <a:t>8/14/2015</a:t>
             </a:fld>
             <a:endParaRPr lang="en-US"/>
           </a:p>
@@ -13959,7 +13959,7 @@
           <a:p>
             <a:fld id="{B15FBB8C-084E-354C-BBCD-E95225EFA9A1}" type="datetimeFigureOut">
               <a:rPr lang="en-US" smtClean="0"/>
-              <a:t>8/13/15</a:t>
+              <a:t>8/14/2015</a:t>
             </a:fld>
             <a:endParaRPr lang="en-US"/>
           </a:p>
@@ -14792,7 +14792,7 @@
           <a:p>
             <a:fld id="{B15FBB8C-084E-354C-BBCD-E95225EFA9A1}" type="datetimeFigureOut">
               <a:rPr lang="en-US" smtClean="0"/>
-              <a:t>8/13/15</a:t>
+              <a:t>8/14/2015</a:t>
             </a:fld>
             <a:endParaRPr lang="en-US"/>
           </a:p>
@@ -15045,7 +15045,7 @@
           <a:p>
             <a:fld id="{B15FBB8C-084E-354C-BBCD-E95225EFA9A1}" type="datetimeFigureOut">
               <a:rPr lang="en-US" smtClean="0"/>
-              <a:t>8/13/15</a:t>
+              <a:t>8/14/2015</a:t>
             </a:fld>
             <a:endParaRPr lang="en-US"/>
           </a:p>
@@ -15258,7 +15258,7 @@
           <a:p>
             <a:fld id="{B15FBB8C-084E-354C-BBCD-E95225EFA9A1}" type="datetimeFigureOut">
               <a:rPr lang="en-US" smtClean="0"/>
-              <a:t>8/13/15</a:t>
+              <a:t>8/14/2015</a:t>
             </a:fld>
             <a:endParaRPr lang="en-US"/>
           </a:p>
@@ -17389,54 +17389,6 @@
           </a:p>
         </p:txBody>
       </p:sp>
-      <p:sp>
-        <p:nvSpPr>
-          <p:cNvPr id="4" name="Rectangle 3"/>
-          <p:cNvSpPr/>
-          <p:nvPr/>
-        </p:nvSpPr>
-        <p:spPr>
-          <a:xfrm>
-            <a:off x="8610600" y="3683000"/>
-            <a:ext cx="2235200" cy="1397000"/>
-          </a:xfrm>
-          <a:prstGeom prst="rect">
-            <a:avLst/>
-          </a:prstGeom>
-          <a:solidFill>
-            <a:schemeClr val="bg2"/>
-          </a:solidFill>
-          <a:ln>
-            <a:solidFill>
-              <a:schemeClr val="tx1"/>
-            </a:solidFill>
-          </a:ln>
-        </p:spPr>
-        <p:style>
-          <a:lnRef idx="2">
-            <a:schemeClr val="accent1">
-              <a:shade val="50000"/>
-            </a:schemeClr>
-          </a:lnRef>
-          <a:fillRef idx="1">
-            <a:schemeClr val="accent1"/>
-          </a:fillRef>
-          <a:effectRef idx="0">
-            <a:schemeClr val="accent1"/>
-          </a:effectRef>
-          <a:fontRef idx="minor">
-            <a:schemeClr val="lt1"/>
-          </a:fontRef>
-        </p:style>
-        <p:txBody>
-          <a:bodyPr rtlCol="0" anchor="ctr"/>
-          <a:lstStyle/>
-          <a:p>
-            <a:pPr algn="ctr"/>
-            <a:endParaRPr lang="en-US"/>
-          </a:p>
-        </p:txBody>
-      </p:sp>
     </p:spTree>
     <p:extLst>
       <p:ext uri="{BB962C8B-B14F-4D97-AF65-F5344CB8AC3E}">
@@ -17476,6 +17428,300 @@
       </p:grpSpPr>
       <p:sp>
         <p:nvSpPr>
+          <p:cNvPr id="3" name="Content Placeholder 2"/>
+          <p:cNvSpPr>
+            <a:spLocks noGrp="1"/>
+          </p:cNvSpPr>
+          <p:nvPr>
+            <p:ph type="body" sz="quarter" idx="10"/>
+          </p:nvPr>
+        </p:nvSpPr>
+        <p:spPr>
+          <a:xfrm>
+            <a:off x="269239" y="1189178"/>
+            <a:ext cx="11841896" cy="2052030"/>
+          </a:xfrm>
+        </p:spPr>
+        <p:txBody>
+          <a:bodyPr>
+            <a:noAutofit/>
+          </a:bodyPr>
+          <a:lstStyle/>
+          <a:p>
+            <a:pPr marL="0" indent="0">
+              <a:buNone/>
+            </a:pPr>
+            <a:r>
+              <a:rPr lang="en-US" sz="4000" dirty="0" smtClean="0">
+                <a:latin typeface="Lucida Console" charset="0"/>
+                <a:ea typeface="Lucida Console" charset="0"/>
+                <a:cs typeface="Lucida Console" charset="0"/>
+              </a:rPr>
+              <a:t>{ </a:t>
+            </a:r>
+          </a:p>
+          <a:p>
+            <a:pPr marL="0" indent="0">
+              <a:buNone/>
+            </a:pPr>
+            <a:r>
+              <a:rPr lang="en-US" sz="2400" dirty="0">
+                <a:latin typeface="Lucida Console" charset="0"/>
+                <a:ea typeface="Lucida Console" charset="0"/>
+                <a:cs typeface="Lucida Console" charset="0"/>
+              </a:rPr>
+              <a:t>	</a:t>
+            </a:r>
+            <a:r>
+              <a:rPr lang="en-US" sz="2400" dirty="0" smtClean="0">
+                <a:latin typeface="Lucida Console" charset="0"/>
+                <a:ea typeface="Lucida Console" charset="0"/>
+                <a:cs typeface="Lucida Console" charset="0"/>
+              </a:rPr>
+              <a:t>name:"</a:t>
+            </a:r>
+            <a:r>
+              <a:rPr lang="en-US" sz="2400" dirty="0" err="1" smtClean="0">
+                <a:latin typeface="Lucida Console" charset="0"/>
+                <a:ea typeface="Lucida Console" charset="0"/>
+                <a:cs typeface="Lucida Console" charset="0"/>
+              </a:rPr>
+              <a:t>DocumentDB</a:t>
+            </a:r>
+            <a:r>
+              <a:rPr lang="en-US" sz="2400" dirty="0" smtClean="0">
+                <a:latin typeface="Lucida Console" charset="0"/>
+                <a:ea typeface="Lucida Console" charset="0"/>
+                <a:cs typeface="Lucida Console" charset="0"/>
+              </a:rPr>
+              <a:t>",</a:t>
+            </a:r>
+          </a:p>
+          <a:p>
+            <a:pPr marL="0" indent="0">
+              <a:buNone/>
+            </a:pPr>
+            <a:r>
+              <a:rPr lang="en-US" sz="2400" dirty="0">
+                <a:latin typeface="Lucida Console" charset="0"/>
+                <a:ea typeface="Lucida Console" charset="0"/>
+                <a:cs typeface="Lucida Console" charset="0"/>
+              </a:rPr>
+              <a:t>	</a:t>
+            </a:r>
+            <a:r>
+              <a:rPr lang="en-US" sz="2400" dirty="0" err="1" smtClean="0">
+                <a:latin typeface="Lucida Console" charset="0"/>
+                <a:ea typeface="Lucida Console" charset="0"/>
+                <a:cs typeface="Lucida Console" charset="0"/>
+              </a:rPr>
+              <a:t>deployedAs</a:t>
+            </a:r>
+            <a:r>
+              <a:rPr lang="en-US" sz="2400" dirty="0" smtClean="0">
+                <a:latin typeface="Lucida Console" charset="0"/>
+                <a:ea typeface="Lucida Console" charset="0"/>
+                <a:cs typeface="Lucida Console" charset="0"/>
+              </a:rPr>
+              <a:t>: "Service",</a:t>
+            </a:r>
+          </a:p>
+          <a:p>
+            <a:pPr marL="0" indent="0">
+              <a:buNone/>
+            </a:pPr>
+            <a:r>
+              <a:rPr lang="en-US" sz="2400" dirty="0" smtClean="0">
+                <a:latin typeface="Lucida Console" charset="0"/>
+                <a:ea typeface="Lucida Console" charset="0"/>
+                <a:cs typeface="Lucida Console" charset="0"/>
+              </a:rPr>
+              <a:t>	</a:t>
+            </a:r>
+            <a:r>
+              <a:rPr lang="en-US" sz="2400" dirty="0" err="1" smtClean="0">
+                <a:latin typeface="Lucida Console" charset="0"/>
+                <a:ea typeface="Lucida Console" charset="0"/>
+                <a:cs typeface="Lucida Console" charset="0"/>
+              </a:rPr>
+              <a:t>dbType</a:t>
+            </a:r>
+            <a:r>
+              <a:rPr lang="en-US" sz="2400" dirty="0" smtClean="0">
+                <a:latin typeface="Lucida Console" charset="0"/>
+                <a:ea typeface="Lucida Console" charset="0"/>
+                <a:cs typeface="Lucida Console" charset="0"/>
+              </a:rPr>
+              <a:t>: "Document",</a:t>
+            </a:r>
+          </a:p>
+          <a:p>
+            <a:pPr marL="0" indent="0">
+              <a:buNone/>
+            </a:pPr>
+            <a:r>
+              <a:rPr lang="en-US" sz="2400" dirty="0">
+                <a:latin typeface="Lucida Console" charset="0"/>
+                <a:ea typeface="Lucida Console" charset="0"/>
+                <a:cs typeface="Lucida Console" charset="0"/>
+              </a:rPr>
+              <a:t>	</a:t>
+            </a:r>
+            <a:r>
+              <a:rPr lang="en-US" sz="2400" dirty="0" err="1" smtClean="0">
+                <a:latin typeface="Lucida Console" charset="0"/>
+                <a:ea typeface="Lucida Console" charset="0"/>
+                <a:cs typeface="Lucida Console" charset="0"/>
+              </a:rPr>
+              <a:t>connectVia</a:t>
+            </a:r>
+            <a:r>
+              <a:rPr lang="en-US" sz="2400" dirty="0" smtClean="0">
+                <a:latin typeface="Lucida Console" charset="0"/>
+                <a:ea typeface="Lucida Console" charset="0"/>
+                <a:cs typeface="Lucida Console" charset="0"/>
+              </a:rPr>
+              <a:t>: [ "rest", "</a:t>
+            </a:r>
+            <a:r>
+              <a:rPr lang="en-US" sz="2400" dirty="0" err="1" smtClean="0">
+                <a:latin typeface="Lucida Console" charset="0"/>
+                <a:ea typeface="Lucida Console" charset="0"/>
+                <a:cs typeface="Lucida Console" charset="0"/>
+              </a:rPr>
+              <a:t>sdk</a:t>
+            </a:r>
+            <a:r>
+              <a:rPr lang="en-US" sz="2400" dirty="0" smtClean="0">
+                <a:latin typeface="Lucida Console" charset="0"/>
+                <a:ea typeface="Lucida Console" charset="0"/>
+                <a:cs typeface="Lucida Console" charset="0"/>
+              </a:rPr>
+              <a:t>" ],</a:t>
+            </a:r>
+          </a:p>
+          <a:p>
+            <a:pPr marL="0" indent="0">
+              <a:buNone/>
+            </a:pPr>
+            <a:r>
+              <a:rPr lang="en-US" sz="2400" dirty="0">
+                <a:latin typeface="Lucida Console" charset="0"/>
+                <a:ea typeface="Lucida Console" charset="0"/>
+                <a:cs typeface="Lucida Console" charset="0"/>
+              </a:rPr>
+              <a:t>	</a:t>
+            </a:r>
+            <a:r>
+              <a:rPr lang="en-US" sz="2400" dirty="0" err="1" smtClean="0">
+                <a:latin typeface="Lucida Console" charset="0"/>
+                <a:ea typeface="Lucida Console" charset="0"/>
+                <a:cs typeface="Lucida Console" charset="0"/>
+              </a:rPr>
+              <a:t>deployVia</a:t>
+            </a:r>
+            <a:r>
+              <a:rPr lang="en-US" sz="2400" dirty="0" smtClean="0">
+                <a:latin typeface="Lucida Console" charset="0"/>
+                <a:ea typeface="Lucida Console" charset="0"/>
+                <a:cs typeface="Lucida Console" charset="0"/>
+              </a:rPr>
+              <a:t>: [ "portal", "rest", "cli" ],</a:t>
+            </a:r>
+          </a:p>
+          <a:p>
+            <a:pPr marL="0" indent="0">
+              <a:buNone/>
+            </a:pPr>
+            <a:r>
+              <a:rPr lang="en-US" sz="2400" dirty="0">
+                <a:latin typeface="Lucida Console" charset="0"/>
+                <a:ea typeface="Lucida Console" charset="0"/>
+                <a:cs typeface="Lucida Console" charset="0"/>
+              </a:rPr>
+              <a:t>	</a:t>
+            </a:r>
+            <a:r>
+              <a:rPr lang="en-US" sz="2400" dirty="0" err="1" smtClean="0">
+                <a:latin typeface="Lucida Console" charset="0"/>
+                <a:ea typeface="Lucida Console" charset="0"/>
+                <a:cs typeface="Lucida Console" charset="0"/>
+              </a:rPr>
+              <a:t>scaleVia</a:t>
+            </a:r>
+            <a:r>
+              <a:rPr lang="en-US" sz="2400" dirty="0" smtClean="0">
+                <a:latin typeface="Lucida Console" charset="0"/>
+                <a:ea typeface="Lucida Console" charset="0"/>
+                <a:cs typeface="Lucida Console" charset="0"/>
+              </a:rPr>
+              <a:t>:  [ "portal", "rest", "cli" ],</a:t>
+            </a:r>
+            <a:br>
+              <a:rPr lang="en-US" sz="2400" dirty="0" smtClean="0">
+                <a:latin typeface="Lucida Console" charset="0"/>
+                <a:ea typeface="Lucida Console" charset="0"/>
+                <a:cs typeface="Lucida Console" charset="0"/>
+              </a:rPr>
+            </a:br>
+            <a:r>
+              <a:rPr lang="en-US" sz="2400" dirty="0" smtClean="0">
+                <a:latin typeface="Lucida Console" charset="0"/>
+                <a:ea typeface="Lucida Console" charset="0"/>
+                <a:cs typeface="Lucida Console" charset="0"/>
+              </a:rPr>
+              <a:t>	</a:t>
+            </a:r>
+            <a:r>
+              <a:rPr lang="en-US" sz="2400" dirty="0" err="1" smtClean="0">
+                <a:latin typeface="Lucida Console" charset="0"/>
+                <a:ea typeface="Lucida Console" charset="0"/>
+                <a:cs typeface="Lucida Console" charset="0"/>
+              </a:rPr>
+              <a:t>differentHow</a:t>
+            </a:r>
+            <a:r>
+              <a:rPr lang="en-US" sz="2400" dirty="0" smtClean="0">
+                <a:latin typeface="Lucida Console" charset="0"/>
+                <a:ea typeface="Lucida Console" charset="0"/>
+                <a:cs typeface="Lucida Console" charset="0"/>
+              </a:rPr>
+              <a:t>: [ "</a:t>
+            </a:r>
+            <a:r>
+              <a:rPr lang="en-US" sz="2400" dirty="0" err="1" smtClean="0">
+                <a:latin typeface="Lucida Console" charset="0"/>
+                <a:ea typeface="Lucida Console" charset="0"/>
+                <a:cs typeface="Lucida Console" charset="0"/>
+              </a:rPr>
+              <a:t>javascript</a:t>
+            </a:r>
+            <a:r>
+              <a:rPr lang="en-US" sz="2400" dirty="0" smtClean="0">
+                <a:latin typeface="Lucida Console" charset="0"/>
+                <a:ea typeface="Lucida Console" charset="0"/>
+                <a:cs typeface="Lucida Console" charset="0"/>
+              </a:rPr>
+              <a:t>", "indexing", "consistency" ]</a:t>
+            </a:r>
+          </a:p>
+          <a:p>
+            <a:pPr marL="0" indent="0">
+              <a:buNone/>
+            </a:pPr>
+            <a:r>
+              <a:rPr lang="en-US" sz="4000" dirty="0">
+                <a:latin typeface="Lucida Console" charset="0"/>
+                <a:ea typeface="Lucida Console" charset="0"/>
+                <a:cs typeface="Lucida Console" charset="0"/>
+              </a:rPr>
+              <a:t>}</a:t>
+            </a:r>
+          </a:p>
+        </p:txBody>
+      </p:sp>
+      <p:sp>
+        <p:nvSpPr>
           <p:cNvPr id="2" name="Title 1"/>
           <p:cNvSpPr>
             <a:spLocks noGrp="1"/>
@@ -17501,300 +17747,6 @@
           </a:p>
         </p:txBody>
       </p:sp>
-      <p:sp>
-        <p:nvSpPr>
-          <p:cNvPr id="3" name="Content Placeholder 2"/>
-          <p:cNvSpPr>
-            <a:spLocks noGrp="1"/>
-          </p:cNvSpPr>
-          <p:nvPr>
-            <p:ph idx="1"/>
-          </p:nvPr>
-        </p:nvSpPr>
-        <p:spPr>
-          <a:xfrm>
-            <a:off x="540777" y="1825625"/>
-            <a:ext cx="12260825" cy="4351338"/>
-          </a:xfrm>
-        </p:spPr>
-        <p:txBody>
-          <a:bodyPr>
-            <a:normAutofit/>
-          </a:bodyPr>
-          <a:lstStyle/>
-          <a:p>
-            <a:pPr marL="0" indent="0">
-              <a:buNone/>
-            </a:pPr>
-            <a:r>
-              <a:rPr lang="en-US" dirty="0" smtClean="0">
-                <a:latin typeface="Lucida Console" charset="0"/>
-                <a:ea typeface="Lucida Console" charset="0"/>
-                <a:cs typeface="Lucida Console" charset="0"/>
-              </a:rPr>
-              <a:t>{ </a:t>
-            </a:r>
-          </a:p>
-          <a:p>
-            <a:pPr marL="0" indent="0">
-              <a:buNone/>
-            </a:pPr>
-            <a:r>
-              <a:rPr lang="en-US" sz="2400" dirty="0">
-                <a:latin typeface="Lucida Console" charset="0"/>
-                <a:ea typeface="Lucida Console" charset="0"/>
-                <a:cs typeface="Lucida Console" charset="0"/>
-              </a:rPr>
-              <a:t>	</a:t>
-            </a:r>
-            <a:r>
-              <a:rPr lang="en-US" sz="2400" dirty="0" smtClean="0">
-                <a:latin typeface="Lucida Console" charset="0"/>
-                <a:ea typeface="Lucida Console" charset="0"/>
-                <a:cs typeface="Lucida Console" charset="0"/>
-              </a:rPr>
-              <a:t>name:"</a:t>
-            </a:r>
-            <a:r>
-              <a:rPr lang="en-US" sz="2400" dirty="0" err="1" smtClean="0">
-                <a:latin typeface="Lucida Console" charset="0"/>
-                <a:ea typeface="Lucida Console" charset="0"/>
-                <a:cs typeface="Lucida Console" charset="0"/>
-              </a:rPr>
-              <a:t>DocumentDB</a:t>
-            </a:r>
-            <a:r>
-              <a:rPr lang="en-US" sz="2400" dirty="0" smtClean="0">
-                <a:latin typeface="Lucida Console" charset="0"/>
-                <a:ea typeface="Lucida Console" charset="0"/>
-                <a:cs typeface="Lucida Console" charset="0"/>
-              </a:rPr>
-              <a:t>",</a:t>
-            </a:r>
-          </a:p>
-          <a:p>
-            <a:pPr marL="0" indent="0">
-              <a:buNone/>
-            </a:pPr>
-            <a:r>
-              <a:rPr lang="en-US" sz="2400" dirty="0">
-                <a:latin typeface="Lucida Console" charset="0"/>
-                <a:ea typeface="Lucida Console" charset="0"/>
-                <a:cs typeface="Lucida Console" charset="0"/>
-              </a:rPr>
-              <a:t>	</a:t>
-            </a:r>
-            <a:r>
-              <a:rPr lang="en-US" sz="2400" dirty="0" err="1" smtClean="0">
-                <a:latin typeface="Lucida Console" charset="0"/>
-                <a:ea typeface="Lucida Console" charset="0"/>
-                <a:cs typeface="Lucida Console" charset="0"/>
-              </a:rPr>
-              <a:t>deployedAs</a:t>
-            </a:r>
-            <a:r>
-              <a:rPr lang="en-US" sz="2400" dirty="0" smtClean="0">
-                <a:latin typeface="Lucida Console" charset="0"/>
-                <a:ea typeface="Lucida Console" charset="0"/>
-                <a:cs typeface="Lucida Console" charset="0"/>
-              </a:rPr>
-              <a:t>: "Service",</a:t>
-            </a:r>
-          </a:p>
-          <a:p>
-            <a:pPr marL="0" indent="0">
-              <a:buNone/>
-            </a:pPr>
-            <a:r>
-              <a:rPr lang="en-US" sz="2400" dirty="0" smtClean="0">
-                <a:latin typeface="Lucida Console" charset="0"/>
-                <a:ea typeface="Lucida Console" charset="0"/>
-                <a:cs typeface="Lucida Console" charset="0"/>
-              </a:rPr>
-              <a:t>	</a:t>
-            </a:r>
-            <a:r>
-              <a:rPr lang="en-US" sz="2400" dirty="0" err="1" smtClean="0">
-                <a:latin typeface="Lucida Console" charset="0"/>
-                <a:ea typeface="Lucida Console" charset="0"/>
-                <a:cs typeface="Lucida Console" charset="0"/>
-              </a:rPr>
-              <a:t>dbType</a:t>
-            </a:r>
-            <a:r>
-              <a:rPr lang="en-US" sz="2400" dirty="0" smtClean="0">
-                <a:latin typeface="Lucida Console" charset="0"/>
-                <a:ea typeface="Lucida Console" charset="0"/>
-                <a:cs typeface="Lucida Console" charset="0"/>
-              </a:rPr>
-              <a:t>: "Document",</a:t>
-            </a:r>
-          </a:p>
-          <a:p>
-            <a:pPr marL="0" indent="0">
-              <a:buNone/>
-            </a:pPr>
-            <a:r>
-              <a:rPr lang="en-US" sz="2400" dirty="0">
-                <a:latin typeface="Lucida Console" charset="0"/>
-                <a:ea typeface="Lucida Console" charset="0"/>
-                <a:cs typeface="Lucida Console" charset="0"/>
-              </a:rPr>
-              <a:t>	</a:t>
-            </a:r>
-            <a:r>
-              <a:rPr lang="en-US" sz="2400" dirty="0" err="1" smtClean="0">
-                <a:latin typeface="Lucida Console" charset="0"/>
-                <a:ea typeface="Lucida Console" charset="0"/>
-                <a:cs typeface="Lucida Console" charset="0"/>
-              </a:rPr>
-              <a:t>connectVia</a:t>
-            </a:r>
-            <a:r>
-              <a:rPr lang="en-US" sz="2400" dirty="0" smtClean="0">
-                <a:latin typeface="Lucida Console" charset="0"/>
-                <a:ea typeface="Lucida Console" charset="0"/>
-                <a:cs typeface="Lucida Console" charset="0"/>
-              </a:rPr>
-              <a:t>: [ "rest", "</a:t>
-            </a:r>
-            <a:r>
-              <a:rPr lang="en-US" sz="2400" dirty="0" err="1" smtClean="0">
-                <a:latin typeface="Lucida Console" charset="0"/>
-                <a:ea typeface="Lucida Console" charset="0"/>
-                <a:cs typeface="Lucida Console" charset="0"/>
-              </a:rPr>
-              <a:t>sdk</a:t>
-            </a:r>
-            <a:r>
-              <a:rPr lang="en-US" sz="2400" dirty="0" smtClean="0">
-                <a:latin typeface="Lucida Console" charset="0"/>
-                <a:ea typeface="Lucida Console" charset="0"/>
-                <a:cs typeface="Lucida Console" charset="0"/>
-              </a:rPr>
-              <a:t>" ],</a:t>
-            </a:r>
-          </a:p>
-          <a:p>
-            <a:pPr marL="0" indent="0">
-              <a:buNone/>
-            </a:pPr>
-            <a:r>
-              <a:rPr lang="en-US" sz="2400" dirty="0">
-                <a:latin typeface="Lucida Console" charset="0"/>
-                <a:ea typeface="Lucida Console" charset="0"/>
-                <a:cs typeface="Lucida Console" charset="0"/>
-              </a:rPr>
-              <a:t>	</a:t>
-            </a:r>
-            <a:r>
-              <a:rPr lang="en-US" sz="2400" dirty="0" err="1" smtClean="0">
-                <a:latin typeface="Lucida Console" charset="0"/>
-                <a:ea typeface="Lucida Console" charset="0"/>
-                <a:cs typeface="Lucida Console" charset="0"/>
-              </a:rPr>
-              <a:t>deployVia</a:t>
-            </a:r>
-            <a:r>
-              <a:rPr lang="en-US" sz="2400" dirty="0" smtClean="0">
-                <a:latin typeface="Lucida Console" charset="0"/>
-                <a:ea typeface="Lucida Console" charset="0"/>
-                <a:cs typeface="Lucida Console" charset="0"/>
-              </a:rPr>
-              <a:t>: [ "portal", "rest", "cli" ],</a:t>
-            </a:r>
-          </a:p>
-          <a:p>
-            <a:pPr marL="0" indent="0">
-              <a:buNone/>
-            </a:pPr>
-            <a:r>
-              <a:rPr lang="en-US" sz="2400" dirty="0">
-                <a:latin typeface="Lucida Console" charset="0"/>
-                <a:ea typeface="Lucida Console" charset="0"/>
-                <a:cs typeface="Lucida Console" charset="0"/>
-              </a:rPr>
-              <a:t>	</a:t>
-            </a:r>
-            <a:r>
-              <a:rPr lang="en-US" sz="2400" dirty="0" err="1" smtClean="0">
-                <a:latin typeface="Lucida Console" charset="0"/>
-                <a:ea typeface="Lucida Console" charset="0"/>
-                <a:cs typeface="Lucida Console" charset="0"/>
-              </a:rPr>
-              <a:t>scaleVia</a:t>
-            </a:r>
-            <a:r>
-              <a:rPr lang="en-US" sz="2400" dirty="0" smtClean="0">
-                <a:latin typeface="Lucida Console" charset="0"/>
-                <a:ea typeface="Lucida Console" charset="0"/>
-                <a:cs typeface="Lucida Console" charset="0"/>
-              </a:rPr>
-              <a:t>:  [ "portal", "rest", "cli" ],</a:t>
-            </a:r>
-            <a:br>
-              <a:rPr lang="en-US" sz="2400" dirty="0" smtClean="0">
-                <a:latin typeface="Lucida Console" charset="0"/>
-                <a:ea typeface="Lucida Console" charset="0"/>
-                <a:cs typeface="Lucida Console" charset="0"/>
-              </a:rPr>
-            </a:br>
-            <a:r>
-              <a:rPr lang="en-US" sz="2400" dirty="0" smtClean="0">
-                <a:latin typeface="Lucida Console" charset="0"/>
-                <a:ea typeface="Lucida Console" charset="0"/>
-                <a:cs typeface="Lucida Console" charset="0"/>
-              </a:rPr>
-              <a:t>	</a:t>
-            </a:r>
-            <a:r>
-              <a:rPr lang="en-US" sz="2400" dirty="0" err="1" smtClean="0">
-                <a:latin typeface="Lucida Console" charset="0"/>
-                <a:ea typeface="Lucida Console" charset="0"/>
-                <a:cs typeface="Lucida Console" charset="0"/>
-              </a:rPr>
-              <a:t>differentHow</a:t>
-            </a:r>
-            <a:r>
-              <a:rPr lang="en-US" sz="2400" dirty="0" smtClean="0">
-                <a:latin typeface="Lucida Console" charset="0"/>
-                <a:ea typeface="Lucida Console" charset="0"/>
-                <a:cs typeface="Lucida Console" charset="0"/>
-              </a:rPr>
-              <a:t>: [ "</a:t>
-            </a:r>
-            <a:r>
-              <a:rPr lang="en-US" sz="2400" dirty="0" err="1" smtClean="0">
-                <a:latin typeface="Lucida Console" charset="0"/>
-                <a:ea typeface="Lucida Console" charset="0"/>
-                <a:cs typeface="Lucida Console" charset="0"/>
-              </a:rPr>
-              <a:t>javascript</a:t>
-            </a:r>
-            <a:r>
-              <a:rPr lang="en-US" sz="2400" dirty="0" smtClean="0">
-                <a:latin typeface="Lucida Console" charset="0"/>
-                <a:ea typeface="Lucida Console" charset="0"/>
-                <a:cs typeface="Lucida Console" charset="0"/>
-              </a:rPr>
-              <a:t>", "indexing", "consistency" ]</a:t>
-            </a:r>
-          </a:p>
-          <a:p>
-            <a:pPr marL="0" indent="0">
-              <a:buNone/>
-            </a:pPr>
-            <a:r>
-              <a:rPr lang="en-US" dirty="0">
-                <a:latin typeface="Lucida Console" charset="0"/>
-                <a:ea typeface="Lucida Console" charset="0"/>
-                <a:cs typeface="Lucida Console" charset="0"/>
-              </a:rPr>
-              <a:t>}</a:t>
-            </a:r>
-          </a:p>
-        </p:txBody>
-      </p:sp>
     </p:spTree>
     <p:extLst>
       <p:ext uri="{BB962C8B-B14F-4D97-AF65-F5344CB8AC3E}">
@@ -17805,6 +17757,9 @@
   <p:clrMapOvr>
     <a:masterClrMapping/>
   </p:clrMapOvr>
+  <p:transition>
+    <p:fade/>
+  </p:transition>
   <p:timing>
     <p:tnLst>
       <p:par>
@@ -25463,12 +25418,7 @@
             <p:ph type="title"/>
           </p:nvPr>
         </p:nvSpPr>
-        <p:spPr>
-          <a:xfrm>
-            <a:off x="838199" y="365125"/>
-            <a:ext cx="11065933" cy="1325563"/>
-          </a:xfrm>
-        </p:spPr>
+        <p:spPr/>
         <p:txBody>
           <a:bodyPr/>
           <a:lstStyle/>
@@ -25488,7 +25438,7 @@
             <a:picLocks noGrp="1" noChangeAspect="1"/>
           </p:cNvPicPr>
           <p:nvPr>
-            <p:ph idx="1"/>
+            <p:ph idx="4294967295"/>
           </p:nvPr>
         </p:nvPicPr>
         <p:blipFill>
@@ -25499,8 +25449,8 @@
         </p:blipFill>
         <p:spPr>
           <a:xfrm>
-            <a:off x="3225713" y="1825625"/>
-            <a:ext cx="6409353" cy="4858272"/>
+            <a:off x="439933" y="1189177"/>
+            <a:ext cx="7466206" cy="5659300"/>
           </a:xfrm>
           <a:prstGeom prst="rect">
             <a:avLst/>
@@ -25517,6 +25467,9 @@
   <p:clrMapOvr>
     <a:masterClrMapping/>
   </p:clrMapOvr>
+  <p:transition>
+    <p:fade/>
+  </p:transition>
   <p:timing>
     <p:tnLst>
       <p:par>
@@ -25546,7 +25499,169 @@
       </p:grpSpPr>
       <p:sp>
         <p:nvSpPr>
-          <p:cNvPr id="2" name="Title 1"/>
+          <p:cNvPr id="3" name="Content Placeholder 2"/>
+          <p:cNvSpPr>
+            <a:spLocks noGrp="1"/>
+          </p:cNvSpPr>
+          <p:nvPr>
+            <p:ph type="body" sz="quarter" idx="10"/>
+          </p:nvPr>
+        </p:nvSpPr>
+        <p:spPr>
+          <a:xfrm>
+            <a:off x="271557" y="1394450"/>
+            <a:ext cx="11653523" cy="4930452"/>
+          </a:xfrm>
+        </p:spPr>
+        <p:txBody>
+          <a:bodyPr/>
+          <a:lstStyle/>
+          <a:p>
+            <a:r>
+              <a:rPr lang="en-US" dirty="0" smtClean="0"/>
+              <a:t>Importing some data</a:t>
+            </a:r>
+          </a:p>
+          <a:p>
+            <a:r>
+              <a:rPr lang="en-US" dirty="0" smtClean="0"/>
+              <a:t>Simple query with equality / inequality</a:t>
+            </a:r>
+            <a:br>
+              <a:rPr lang="en-US" dirty="0" smtClean="0"/>
+            </a:br>
+            <a:endParaRPr lang="en-US" dirty="0" smtClean="0"/>
+          </a:p>
+          <a:p>
+            <a:r>
+              <a:rPr lang="en-US" dirty="0" smtClean="0"/>
+              <a:t>Query against nested arrays</a:t>
+            </a:r>
+            <a:br>
+              <a:rPr lang="en-US" dirty="0" smtClean="0"/>
+            </a:br>
+            <a:endParaRPr lang="en-US" dirty="0" smtClean="0"/>
+          </a:p>
+          <a:p>
+            <a:r>
+              <a:rPr lang="en-US" dirty="0" smtClean="0"/>
+              <a:t>Query on ranges</a:t>
+            </a:r>
+            <a:br>
+              <a:rPr lang="en-US" dirty="0" smtClean="0"/>
+            </a:br>
+            <a:endParaRPr lang="en-US" dirty="0" smtClean="0"/>
+          </a:p>
+          <a:p>
+            <a:r>
+              <a:rPr lang="en-US" dirty="0" smtClean="0"/>
+              <a:t>Query on distance using geospatial capabilities</a:t>
+            </a:r>
+            <a:r>
+              <a:rPr lang="en-US" dirty="0"/>
+              <a:t/>
+            </a:r>
+            <a:br>
+              <a:rPr lang="en-US" dirty="0"/>
+            </a:br>
+            <a:r>
+              <a:rPr lang="en-US" dirty="0" smtClean="0"/>
+              <a:t>	</a:t>
+            </a:r>
+            <a:r>
+              <a:rPr lang="en-US" sz="1800" dirty="0" smtClean="0"/>
+              <a:t>SELECT </a:t>
+            </a:r>
+            <a:r>
+              <a:rPr lang="en-US" sz="1800" dirty="0"/>
+              <a:t>*</a:t>
+            </a:r>
+          </a:p>
+          <a:p>
+            <a:pPr marL="0" indent="0">
+              <a:buNone/>
+            </a:pPr>
+            <a:r>
+              <a:rPr lang="en-US" sz="1800" dirty="0" smtClean="0"/>
+              <a:t>	FROM cinemas c</a:t>
+            </a:r>
+            <a:endParaRPr lang="en-US" sz="1800" dirty="0"/>
+          </a:p>
+          <a:p>
+            <a:pPr marL="0" indent="0">
+              <a:buNone/>
+            </a:pPr>
+            <a:r>
+              <a:rPr lang="en-US" sz="1800" dirty="0" smtClean="0"/>
+              <a:t>	WHERE ST_DISTANCE(</a:t>
+            </a:r>
+            <a:r>
+              <a:rPr lang="en-US" sz="1800" dirty="0" err="1" smtClean="0"/>
+              <a:t>c.Location</a:t>
+            </a:r>
+            <a:r>
+              <a:rPr lang="en-US" sz="1800" dirty="0"/>
+              <a:t>, { </a:t>
+            </a:r>
+          </a:p>
+          <a:p>
+            <a:pPr marL="0" indent="0">
+              <a:buNone/>
+            </a:pPr>
+            <a:r>
+              <a:rPr lang="en-US" sz="1800" dirty="0"/>
+              <a:t>	"type": "Point", </a:t>
+            </a:r>
+          </a:p>
+          <a:p>
+            <a:pPr marL="0" indent="0">
+              <a:buNone/>
+            </a:pPr>
+            <a:r>
+              <a:rPr lang="en-US" sz="1800" dirty="0"/>
+              <a:t>	"coordinates": </a:t>
+            </a:r>
+            <a:r>
+              <a:rPr lang="en-US" sz="1800" dirty="0" smtClean="0"/>
+              <a:t>[-121.889125, </a:t>
+            </a:r>
+            <a:r>
+              <a:rPr lang="en-US" sz="1800" dirty="0"/>
+              <a:t>37.33034</a:t>
+            </a:r>
+            <a:r>
+              <a:rPr lang="en-US" sz="1800" dirty="0" smtClean="0"/>
+              <a:t>] </a:t>
+            </a:r>
+            <a:endParaRPr lang="en-US" sz="1800" dirty="0"/>
+          </a:p>
+          <a:p>
+            <a:pPr marL="0" indent="0">
+              <a:buNone/>
+            </a:pPr>
+            <a:r>
+              <a:rPr lang="en-US" sz="1800" dirty="0"/>
+              <a:t>	}) &lt; </a:t>
+            </a:r>
+            <a:r>
+              <a:rPr lang="en-US" sz="1800" dirty="0" smtClean="0"/>
+              <a:t>5 </a:t>
+            </a:r>
+            <a:r>
+              <a:rPr lang="en-US" sz="1800" dirty="0"/>
+              <a:t>* </a:t>
+            </a:r>
+            <a:r>
+              <a:rPr lang="en-US" sz="1800" dirty="0" smtClean="0"/>
+              <a:t>1600</a:t>
+            </a:r>
+            <a:endParaRPr lang="en-US" sz="1800" dirty="0"/>
+          </a:p>
+        </p:txBody>
+      </p:sp>
+      <p:sp>
+        <p:nvSpPr>
+          <p:cNvPr id="4" name="Title 3"/>
           <p:cNvSpPr>
             <a:spLocks noGrp="1"/>
           </p:cNvSpPr>
@@ -25559,30 +25674,11 @@
           <a:bodyPr/>
           <a:lstStyle/>
           <a:p>
+            <a:r>
+              <a:rPr lang="en-US" dirty="0" smtClean="0"/>
+              <a:t>Demo time …</a:t>
+            </a:r>
             <a:endParaRPr lang="en-US" dirty="0"/>
-          </a:p>
-        </p:txBody>
-      </p:sp>
-      <p:sp>
-        <p:nvSpPr>
-          <p:cNvPr id="3" name="Content Placeholder 2"/>
-          <p:cNvSpPr>
-            <a:spLocks noGrp="1"/>
-          </p:cNvSpPr>
-          <p:nvPr>
-            <p:ph idx="1"/>
-          </p:nvPr>
-        </p:nvSpPr>
-        <p:spPr/>
-        <p:txBody>
-          <a:bodyPr/>
-          <a:lstStyle/>
-          <a:p>
-            <a:r>
-              <a:rPr lang="en-US" smtClean="0"/>
-              <a:t>Demo time…</a:t>
-            </a:r>
-            <a:endParaRPr lang="en-US"/>
           </a:p>
         </p:txBody>
       </p:sp>
@@ -25596,6 +25692,9 @@
   <p:clrMapOvr>
     <a:masterClrMapping/>
   </p:clrMapOvr>
+  <p:transition>
+    <p:fade/>
+  </p:transition>
   <p:timing>
     <p:tnLst>
       <p:par>

</xml_diff>